<commit_message>
Update Bridge Design Pattern.pptx
</commit_message>
<xml_diff>
--- a/Design Patterns/Bridge Design Pattern.pptx
+++ b/Design Patterns/Bridge Design Pattern.pptx
@@ -4,6 +4,9 @@
   <p:sldMasterIdLst>
     <p:sldMasterId id="2147483648" r:id="rId1"/>
   </p:sldMasterIdLst>
+  <p:notesMasterIdLst>
+    <p:notesMasterId r:id="rId5"/>
+  </p:notesMasterIdLst>
   <p:sldIdLst>
     <p:sldId id="256" r:id="rId2"/>
     <p:sldId id="257" r:id="rId3"/>
@@ -106,7 +109,451 @@
       </a:defRPr>
     </a:lvl9pPr>
   </p:defaultTextStyle>
+  <p:extLst>
+    <p:ext uri="{EFAFB233-063F-42B5-8137-9DF3F51BA10A}">
+      <p15:sldGuideLst xmlns:p15="http://schemas.microsoft.com/office/powerpoint/2012/main"/>
+    </p:ext>
+  </p:extLst>
 </p:presentation>
+</file>
+
+<file path=ppt/notesMasters/notesMaster1.xml><?xml version="1.0" encoding="utf-8"?>
+<p:notesMaster xmlns:a="http://schemas.openxmlformats.org/drawingml/2006/main" xmlns:r="http://schemas.openxmlformats.org/officeDocument/2006/relationships" xmlns:p="http://schemas.openxmlformats.org/presentationml/2006/main">
+  <p:cSld>
+    <p:bg>
+      <p:bgRef idx="1001">
+        <a:schemeClr val="bg1"/>
+      </p:bgRef>
+    </p:bg>
+    <p:spTree>
+      <p:nvGrpSpPr>
+        <p:cNvPr id="1" name=""/>
+        <p:cNvGrpSpPr/>
+        <p:nvPr/>
+      </p:nvGrpSpPr>
+      <p:grpSpPr>
+        <a:xfrm>
+          <a:off x="0" y="0"/>
+          <a:ext cx="0" cy="0"/>
+          <a:chOff x="0" y="0"/>
+          <a:chExt cx="0" cy="0"/>
+        </a:xfrm>
+      </p:grpSpPr>
+      <p:sp>
+        <p:nvSpPr>
+          <p:cNvPr id="2" name="Header Placeholder 1"/>
+          <p:cNvSpPr>
+            <a:spLocks noGrp="1"/>
+          </p:cNvSpPr>
+          <p:nvPr>
+            <p:ph type="hdr" sz="quarter"/>
+          </p:nvPr>
+        </p:nvSpPr>
+        <p:spPr>
+          <a:xfrm>
+            <a:off x="0" y="0"/>
+            <a:ext cx="2971800" cy="458788"/>
+          </a:xfrm>
+          <a:prstGeom prst="rect">
+            <a:avLst/>
+          </a:prstGeom>
+        </p:spPr>
+        <p:txBody>
+          <a:bodyPr vert="horz" lIns="91440" tIns="45720" rIns="91440" bIns="45720" rtlCol="0"/>
+          <a:lstStyle>
+            <a:lvl1pPr algn="l">
+              <a:defRPr sz="1200"/>
+            </a:lvl1pPr>
+          </a:lstStyle>
+          <a:p>
+            <a:endParaRPr lang="en-US"/>
+          </a:p>
+        </p:txBody>
+      </p:sp>
+      <p:sp>
+        <p:nvSpPr>
+          <p:cNvPr id="3" name="Date Placeholder 2"/>
+          <p:cNvSpPr>
+            <a:spLocks noGrp="1"/>
+          </p:cNvSpPr>
+          <p:nvPr>
+            <p:ph type="dt" idx="1"/>
+          </p:nvPr>
+        </p:nvSpPr>
+        <p:spPr>
+          <a:xfrm>
+            <a:off x="3884613" y="0"/>
+            <a:ext cx="2971800" cy="458788"/>
+          </a:xfrm>
+          <a:prstGeom prst="rect">
+            <a:avLst/>
+          </a:prstGeom>
+        </p:spPr>
+        <p:txBody>
+          <a:bodyPr vert="horz" lIns="91440" tIns="45720" rIns="91440" bIns="45720" rtlCol="0"/>
+          <a:lstStyle>
+            <a:lvl1pPr algn="r">
+              <a:defRPr sz="1200"/>
+            </a:lvl1pPr>
+          </a:lstStyle>
+          <a:p>
+            <a:fld id="{D9223263-2300-4AC1-BB7E-FFDBA5CF77B2}" type="datetimeFigureOut">
+              <a:rPr lang="en-US" smtClean="0"/>
+              <a:t>4/25/2019</a:t>
+            </a:fld>
+            <a:endParaRPr lang="en-US"/>
+          </a:p>
+        </p:txBody>
+      </p:sp>
+      <p:sp>
+        <p:nvSpPr>
+          <p:cNvPr id="4" name="Slide Image Placeholder 3"/>
+          <p:cNvSpPr>
+            <a:spLocks noGrp="1" noRot="1" noChangeAspect="1"/>
+          </p:cNvSpPr>
+          <p:nvPr>
+            <p:ph type="sldImg" idx="2"/>
+          </p:nvPr>
+        </p:nvSpPr>
+        <p:spPr>
+          <a:xfrm>
+            <a:off x="685800" y="1143000"/>
+            <a:ext cx="5486400" cy="3086100"/>
+          </a:xfrm>
+          <a:prstGeom prst="rect">
+            <a:avLst/>
+          </a:prstGeom>
+          <a:noFill/>
+          <a:ln w="12700">
+            <a:solidFill>
+              <a:prstClr val="black"/>
+            </a:solidFill>
+          </a:ln>
+        </p:spPr>
+        <p:txBody>
+          <a:bodyPr vert="horz" lIns="91440" tIns="45720" rIns="91440" bIns="45720" rtlCol="0" anchor="ctr"/>
+          <a:lstStyle/>
+          <a:p>
+            <a:endParaRPr lang="en-US"/>
+          </a:p>
+        </p:txBody>
+      </p:sp>
+      <p:sp>
+        <p:nvSpPr>
+          <p:cNvPr id="5" name="Notes Placeholder 4"/>
+          <p:cNvSpPr>
+            <a:spLocks noGrp="1"/>
+          </p:cNvSpPr>
+          <p:nvPr>
+            <p:ph type="body" sz="quarter" idx="3"/>
+          </p:nvPr>
+        </p:nvSpPr>
+        <p:spPr>
+          <a:xfrm>
+            <a:off x="685800" y="4400550"/>
+            <a:ext cx="5486400" cy="3600450"/>
+          </a:xfrm>
+          <a:prstGeom prst="rect">
+            <a:avLst/>
+          </a:prstGeom>
+        </p:spPr>
+        <p:txBody>
+          <a:bodyPr vert="horz" lIns="91440" tIns="45720" rIns="91440" bIns="45720" rtlCol="0"/>
+          <a:lstStyle/>
+          <a:p>
+            <a:pPr lvl="0"/>
+            <a:r>
+              <a:rPr lang="en-US"/>
+              <a:t>Edit Master text styles</a:t>
+            </a:r>
+          </a:p>
+          <a:p>
+            <a:pPr lvl="1"/>
+            <a:r>
+              <a:rPr lang="en-US"/>
+              <a:t>Second level</a:t>
+            </a:r>
+          </a:p>
+          <a:p>
+            <a:pPr lvl="2"/>
+            <a:r>
+              <a:rPr lang="en-US"/>
+              <a:t>Third level</a:t>
+            </a:r>
+          </a:p>
+          <a:p>
+            <a:pPr lvl="3"/>
+            <a:r>
+              <a:rPr lang="en-US"/>
+              <a:t>Fourth level</a:t>
+            </a:r>
+          </a:p>
+          <a:p>
+            <a:pPr lvl="4"/>
+            <a:r>
+              <a:rPr lang="en-US"/>
+              <a:t>Fifth level</a:t>
+            </a:r>
+          </a:p>
+        </p:txBody>
+      </p:sp>
+      <p:sp>
+        <p:nvSpPr>
+          <p:cNvPr id="6" name="Footer Placeholder 5"/>
+          <p:cNvSpPr>
+            <a:spLocks noGrp="1"/>
+          </p:cNvSpPr>
+          <p:nvPr>
+            <p:ph type="ftr" sz="quarter" idx="4"/>
+          </p:nvPr>
+        </p:nvSpPr>
+        <p:spPr>
+          <a:xfrm>
+            <a:off x="0" y="8685213"/>
+            <a:ext cx="2971800" cy="458787"/>
+          </a:xfrm>
+          <a:prstGeom prst="rect">
+            <a:avLst/>
+          </a:prstGeom>
+        </p:spPr>
+        <p:txBody>
+          <a:bodyPr vert="horz" lIns="91440" tIns="45720" rIns="91440" bIns="45720" rtlCol="0" anchor="b"/>
+          <a:lstStyle>
+            <a:lvl1pPr algn="l">
+              <a:defRPr sz="1200"/>
+            </a:lvl1pPr>
+          </a:lstStyle>
+          <a:p>
+            <a:endParaRPr lang="en-US"/>
+          </a:p>
+        </p:txBody>
+      </p:sp>
+      <p:sp>
+        <p:nvSpPr>
+          <p:cNvPr id="7" name="Slide Number Placeholder 6"/>
+          <p:cNvSpPr>
+            <a:spLocks noGrp="1"/>
+          </p:cNvSpPr>
+          <p:nvPr>
+            <p:ph type="sldNum" sz="quarter" idx="5"/>
+          </p:nvPr>
+        </p:nvSpPr>
+        <p:spPr>
+          <a:xfrm>
+            <a:off x="3884613" y="8685213"/>
+            <a:ext cx="2971800" cy="458787"/>
+          </a:xfrm>
+          <a:prstGeom prst="rect">
+            <a:avLst/>
+          </a:prstGeom>
+        </p:spPr>
+        <p:txBody>
+          <a:bodyPr vert="horz" lIns="91440" tIns="45720" rIns="91440" bIns="45720" rtlCol="0" anchor="b"/>
+          <a:lstStyle>
+            <a:lvl1pPr algn="r">
+              <a:defRPr sz="1200"/>
+            </a:lvl1pPr>
+          </a:lstStyle>
+          <a:p>
+            <a:fld id="{0187D12A-64D4-4043-8A6B-E859BF4A2B12}" type="slidenum">
+              <a:rPr lang="en-US" smtClean="0"/>
+              <a:t>‹#›</a:t>
+            </a:fld>
+            <a:endParaRPr lang="en-US"/>
+          </a:p>
+        </p:txBody>
+      </p:sp>
+    </p:spTree>
+    <p:extLst>
+      <p:ext uri="{BB962C8B-B14F-4D97-AF65-F5344CB8AC3E}">
+        <p14:creationId xmlns:p14="http://schemas.microsoft.com/office/powerpoint/2010/main" val="3914118002"/>
+      </p:ext>
+    </p:extLst>
+  </p:cSld>
+  <p:clrMap bg1="lt1" tx1="dk1" bg2="lt2" tx2="dk2" accent1="accent1" accent2="accent2" accent3="accent3" accent4="accent4" accent5="accent5" accent6="accent6" hlink="hlink" folHlink="folHlink"/>
+  <p:notesStyle>
+    <a:lvl1pPr marL="0" algn="l" defTabSz="914400" rtl="0" eaLnBrk="1" latinLnBrk="0" hangingPunct="1">
+      <a:defRPr sz="1200" kern="1200">
+        <a:solidFill>
+          <a:schemeClr val="tx1"/>
+        </a:solidFill>
+        <a:latin typeface="+mn-lt"/>
+        <a:ea typeface="+mn-ea"/>
+        <a:cs typeface="+mn-cs"/>
+      </a:defRPr>
+    </a:lvl1pPr>
+    <a:lvl2pPr marL="457200" algn="l" defTabSz="914400" rtl="0" eaLnBrk="1" latinLnBrk="0" hangingPunct="1">
+      <a:defRPr sz="1200" kern="1200">
+        <a:solidFill>
+          <a:schemeClr val="tx1"/>
+        </a:solidFill>
+        <a:latin typeface="+mn-lt"/>
+        <a:ea typeface="+mn-ea"/>
+        <a:cs typeface="+mn-cs"/>
+      </a:defRPr>
+    </a:lvl2pPr>
+    <a:lvl3pPr marL="914400" algn="l" defTabSz="914400" rtl="0" eaLnBrk="1" latinLnBrk="0" hangingPunct="1">
+      <a:defRPr sz="1200" kern="1200">
+        <a:solidFill>
+          <a:schemeClr val="tx1"/>
+        </a:solidFill>
+        <a:latin typeface="+mn-lt"/>
+        <a:ea typeface="+mn-ea"/>
+        <a:cs typeface="+mn-cs"/>
+      </a:defRPr>
+    </a:lvl3pPr>
+    <a:lvl4pPr marL="1371600" algn="l" defTabSz="914400" rtl="0" eaLnBrk="1" latinLnBrk="0" hangingPunct="1">
+      <a:defRPr sz="1200" kern="1200">
+        <a:solidFill>
+          <a:schemeClr val="tx1"/>
+        </a:solidFill>
+        <a:latin typeface="+mn-lt"/>
+        <a:ea typeface="+mn-ea"/>
+        <a:cs typeface="+mn-cs"/>
+      </a:defRPr>
+    </a:lvl4pPr>
+    <a:lvl5pPr marL="1828800" algn="l" defTabSz="914400" rtl="0" eaLnBrk="1" latinLnBrk="0" hangingPunct="1">
+      <a:defRPr sz="1200" kern="1200">
+        <a:solidFill>
+          <a:schemeClr val="tx1"/>
+        </a:solidFill>
+        <a:latin typeface="+mn-lt"/>
+        <a:ea typeface="+mn-ea"/>
+        <a:cs typeface="+mn-cs"/>
+      </a:defRPr>
+    </a:lvl5pPr>
+    <a:lvl6pPr marL="2286000" algn="l" defTabSz="914400" rtl="0" eaLnBrk="1" latinLnBrk="0" hangingPunct="1">
+      <a:defRPr sz="1200" kern="1200">
+        <a:solidFill>
+          <a:schemeClr val="tx1"/>
+        </a:solidFill>
+        <a:latin typeface="+mn-lt"/>
+        <a:ea typeface="+mn-ea"/>
+        <a:cs typeface="+mn-cs"/>
+      </a:defRPr>
+    </a:lvl6pPr>
+    <a:lvl7pPr marL="2743200" algn="l" defTabSz="914400" rtl="0" eaLnBrk="1" latinLnBrk="0" hangingPunct="1">
+      <a:defRPr sz="1200" kern="1200">
+        <a:solidFill>
+          <a:schemeClr val="tx1"/>
+        </a:solidFill>
+        <a:latin typeface="+mn-lt"/>
+        <a:ea typeface="+mn-ea"/>
+        <a:cs typeface="+mn-cs"/>
+      </a:defRPr>
+    </a:lvl7pPr>
+    <a:lvl8pPr marL="3200400" algn="l" defTabSz="914400" rtl="0" eaLnBrk="1" latinLnBrk="0" hangingPunct="1">
+      <a:defRPr sz="1200" kern="1200">
+        <a:solidFill>
+          <a:schemeClr val="tx1"/>
+        </a:solidFill>
+        <a:latin typeface="+mn-lt"/>
+        <a:ea typeface="+mn-ea"/>
+        <a:cs typeface="+mn-cs"/>
+      </a:defRPr>
+    </a:lvl8pPr>
+    <a:lvl9pPr marL="3657600" algn="l" defTabSz="914400" rtl="0" eaLnBrk="1" latinLnBrk="0" hangingPunct="1">
+      <a:defRPr sz="1200" kern="1200">
+        <a:solidFill>
+          <a:schemeClr val="tx1"/>
+        </a:solidFill>
+        <a:latin typeface="+mn-lt"/>
+        <a:ea typeface="+mn-ea"/>
+        <a:cs typeface="+mn-cs"/>
+      </a:defRPr>
+    </a:lvl9pPr>
+  </p:notesStyle>
+</p:notesMaster>
+</file>
+
+<file path=ppt/notesSlides/notesSlide1.xml><?xml version="1.0" encoding="utf-8"?>
+<p:notes xmlns:a="http://schemas.openxmlformats.org/drawingml/2006/main" xmlns:r="http://schemas.openxmlformats.org/officeDocument/2006/relationships" xmlns:p="http://schemas.openxmlformats.org/presentationml/2006/main">
+  <p:cSld>
+    <p:spTree>
+      <p:nvGrpSpPr>
+        <p:cNvPr id="1" name=""/>
+        <p:cNvGrpSpPr/>
+        <p:nvPr/>
+      </p:nvGrpSpPr>
+      <p:grpSpPr>
+        <a:xfrm>
+          <a:off x="0" y="0"/>
+          <a:ext cx="0" cy="0"/>
+          <a:chOff x="0" y="0"/>
+          <a:chExt cx="0" cy="0"/>
+        </a:xfrm>
+      </p:grpSpPr>
+      <p:sp>
+        <p:nvSpPr>
+          <p:cNvPr id="2" name="Slide Image Placeholder 1"/>
+          <p:cNvSpPr>
+            <a:spLocks noGrp="1" noRot="1" noChangeAspect="1"/>
+          </p:cNvSpPr>
+          <p:nvPr>
+            <p:ph type="sldImg"/>
+          </p:nvPr>
+        </p:nvSpPr>
+        <p:spPr/>
+      </p:sp>
+      <p:sp>
+        <p:nvSpPr>
+          <p:cNvPr id="3" name="Notes Placeholder 2"/>
+          <p:cNvSpPr>
+            <a:spLocks noGrp="1"/>
+          </p:cNvSpPr>
+          <p:nvPr>
+            <p:ph type="body" idx="1"/>
+          </p:nvPr>
+        </p:nvSpPr>
+        <p:spPr/>
+        <p:txBody>
+          <a:bodyPr/>
+          <a:lstStyle/>
+          <a:p>
+            <a:r>
+              <a:rPr lang="en-US">
+                <a:hlinkClick r:id="rId3"/>
+              </a:rPr>
+              <a:t>https://www.youtube.com/watch?v=9jIgSsIfh_8</a:t>
+            </a:r>
+            <a:endParaRPr lang="en-US"/>
+          </a:p>
+        </p:txBody>
+      </p:sp>
+      <p:sp>
+        <p:nvSpPr>
+          <p:cNvPr id="4" name="Slide Number Placeholder 3"/>
+          <p:cNvSpPr>
+            <a:spLocks noGrp="1"/>
+          </p:cNvSpPr>
+          <p:nvPr>
+            <p:ph type="sldNum" sz="quarter" idx="5"/>
+          </p:nvPr>
+        </p:nvSpPr>
+        <p:spPr/>
+        <p:txBody>
+          <a:bodyPr/>
+          <a:lstStyle/>
+          <a:p>
+            <a:fld id="{0187D12A-64D4-4043-8A6B-E859BF4A2B12}" type="slidenum">
+              <a:rPr lang="en-US" smtClean="0"/>
+              <a:t>2</a:t>
+            </a:fld>
+            <a:endParaRPr lang="en-US"/>
+          </a:p>
+        </p:txBody>
+      </p:sp>
+    </p:spTree>
+    <p:extLst>
+      <p:ext uri="{BB962C8B-B14F-4D97-AF65-F5344CB8AC3E}">
+        <p14:creationId xmlns:p14="http://schemas.microsoft.com/office/powerpoint/2010/main" val="3164694390"/>
+      </p:ext>
+    </p:extLst>
+  </p:cSld>
+  <p:clrMapOvr>
+    <a:masterClrMapping/>
+  </p:clrMapOvr>
+</p:notes>
 </file>
 
 <file path=ppt/slideLayouts/slideLayout1.xml><?xml version="1.0" encoding="utf-8"?>
@@ -166,7 +613,7 @@
           <a:noFill/>
           <a:extLst>
             <a:ext uri="{909E8E84-426E-40dd-AFC4-6F175D3DCCD1}">
-              <a14:hiddenFill xmlns:a14="http://schemas.microsoft.com/office/drawing/2010/main" xmlns="">
+              <a14:hiddenFill xmlns="" xmlns:a14="http://schemas.microsoft.com/office/drawing/2010/main">
                 <a:solidFill>
                   <a:srgbClr val="FFFFFF"/>
                 </a:solidFill>
@@ -225,7 +672,7 @@
             </a:ln>
             <a:extLst>
               <a:ext uri="{91240B29-F687-4f45-9708-019B960494DF}">
-                <a14:hiddenLine xmlns:a14="http://schemas.microsoft.com/office/drawing/2010/main" xmlns="" w="9525">
+                <a14:hiddenLine xmlns="" xmlns:a14="http://schemas.microsoft.com/office/drawing/2010/main" w="9525">
                   <a:solidFill>
                     <a:srgbClr val="000000"/>
                   </a:solidFill>
@@ -315,7 +762,7 @@
             </a:ln>
             <a:extLst>
               <a:ext uri="{91240B29-F687-4f45-9708-019B960494DF}">
-                <a14:hiddenLine xmlns:a14="http://schemas.microsoft.com/office/drawing/2010/main" xmlns="" w="9525">
+                <a14:hiddenLine xmlns="" xmlns:a14="http://schemas.microsoft.com/office/drawing/2010/main" w="9525">
                   <a:solidFill>
                     <a:srgbClr val="000000"/>
                   </a:solidFill>
@@ -405,7 +852,7 @@
             </a:ln>
             <a:extLst>
               <a:ext uri="{91240B29-F687-4f45-9708-019B960494DF}">
-                <a14:hiddenLine xmlns:a14="http://schemas.microsoft.com/office/drawing/2010/main" xmlns="" w="9525">
+                <a14:hiddenLine xmlns="" xmlns:a14="http://schemas.microsoft.com/office/drawing/2010/main" w="9525">
                   <a:solidFill>
                     <a:srgbClr val="000000"/>
                   </a:solidFill>
@@ -439,7 +886,7 @@
             </a:ln>
             <a:extLst>
               <a:ext uri="{91240B29-F687-4f45-9708-019B960494DF}">
-                <a14:hiddenLine xmlns:a14="http://schemas.microsoft.com/office/drawing/2010/main" xmlns="" w="9525">
+                <a14:hiddenLine xmlns="" xmlns:a14="http://schemas.microsoft.com/office/drawing/2010/main" w="9525">
                   <a:solidFill>
                     <a:srgbClr val="000000"/>
                   </a:solidFill>
@@ -529,7 +976,7 @@
             </a:ln>
             <a:extLst>
               <a:ext uri="{91240B29-F687-4f45-9708-019B960494DF}">
-                <a14:hiddenLine xmlns:a14="http://schemas.microsoft.com/office/drawing/2010/main" xmlns="" w="9525">
+                <a14:hiddenLine xmlns="" xmlns:a14="http://schemas.microsoft.com/office/drawing/2010/main" w="9525">
                   <a:solidFill>
                     <a:srgbClr val="000000"/>
                   </a:solidFill>
@@ -591,7 +1038,7 @@
             </a:ln>
             <a:extLst>
               <a:ext uri="{91240B29-F687-4f45-9708-019B960494DF}">
-                <a14:hiddenLine xmlns:a14="http://schemas.microsoft.com/office/drawing/2010/main" xmlns="" w="9525">
+                <a14:hiddenLine xmlns="" xmlns:a14="http://schemas.microsoft.com/office/drawing/2010/main" w="9525">
                   <a:solidFill>
                     <a:srgbClr val="000000"/>
                   </a:solidFill>
@@ -653,7 +1100,7 @@
             </a:ln>
             <a:extLst>
               <a:ext uri="{91240B29-F687-4f45-9708-019B960494DF}">
-                <a14:hiddenLine xmlns:a14="http://schemas.microsoft.com/office/drawing/2010/main" xmlns="" w="9525">
+                <a14:hiddenLine xmlns="" xmlns:a14="http://schemas.microsoft.com/office/drawing/2010/main" w="9525">
                   <a:solidFill>
                     <a:srgbClr val="000000"/>
                   </a:solidFill>
@@ -743,7 +1190,7 @@
             </a:ln>
             <a:extLst>
               <a:ext uri="{91240B29-F687-4f45-9708-019B960494DF}">
-                <a14:hiddenLine xmlns:a14="http://schemas.microsoft.com/office/drawing/2010/main" xmlns="" w="9525">
+                <a14:hiddenLine xmlns="" xmlns:a14="http://schemas.microsoft.com/office/drawing/2010/main" w="9525">
                   <a:solidFill>
                     <a:srgbClr val="000000"/>
                   </a:solidFill>
@@ -805,7 +1252,7 @@
             </a:ln>
             <a:extLst>
               <a:ext uri="{91240B29-F687-4f45-9708-019B960494DF}">
-                <a14:hiddenLine xmlns:a14="http://schemas.microsoft.com/office/drawing/2010/main" xmlns="" w="9525">
+                <a14:hiddenLine xmlns="" xmlns:a14="http://schemas.microsoft.com/office/drawing/2010/main" w="9525">
                   <a:solidFill>
                     <a:srgbClr val="000000"/>
                   </a:solidFill>
@@ -867,7 +1314,7 @@
             </a:ln>
             <a:extLst>
               <a:ext uri="{91240B29-F687-4f45-9708-019B960494DF}">
-                <a14:hiddenLine xmlns:a14="http://schemas.microsoft.com/office/drawing/2010/main" xmlns="" w="9525">
+                <a14:hiddenLine xmlns="" xmlns:a14="http://schemas.microsoft.com/office/drawing/2010/main" w="9525">
                   <a:solidFill>
                     <a:srgbClr val="000000"/>
                   </a:solidFill>
@@ -957,7 +1404,7 @@
             </a:ln>
             <a:extLst>
               <a:ext uri="{91240B29-F687-4f45-9708-019B960494DF}">
-                <a14:hiddenLine xmlns:a14="http://schemas.microsoft.com/office/drawing/2010/main" xmlns="" w="9525">
+                <a14:hiddenLine xmlns="" xmlns:a14="http://schemas.microsoft.com/office/drawing/2010/main" w="9525">
                   <a:solidFill>
                     <a:srgbClr val="000000"/>
                   </a:solidFill>
@@ -1047,7 +1494,7 @@
             </a:ln>
             <a:extLst>
               <a:ext uri="{91240B29-F687-4f45-9708-019B960494DF}">
-                <a14:hiddenLine xmlns:a14="http://schemas.microsoft.com/office/drawing/2010/main" xmlns="" w="9525">
+                <a14:hiddenLine xmlns="" xmlns:a14="http://schemas.microsoft.com/office/drawing/2010/main" w="9525">
                   <a:solidFill>
                     <a:srgbClr val="000000"/>
                   </a:solidFill>
@@ -1109,7 +1556,7 @@
             </a:ln>
             <a:extLst>
               <a:ext uri="{91240B29-F687-4f45-9708-019B960494DF}">
-                <a14:hiddenLine xmlns:a14="http://schemas.microsoft.com/office/drawing/2010/main" xmlns="" w="9525">
+                <a14:hiddenLine xmlns="" xmlns:a14="http://schemas.microsoft.com/office/drawing/2010/main" w="9525">
                   <a:solidFill>
                     <a:srgbClr val="000000"/>
                   </a:solidFill>
@@ -1219,7 +1666,7 @@
             </a:ln>
             <a:extLst>
               <a:ext uri="{91240B29-F687-4f45-9708-019B960494DF}">
-                <a14:hiddenLine xmlns:a14="http://schemas.microsoft.com/office/drawing/2010/main" xmlns="" w="9525">
+                <a14:hiddenLine xmlns="" xmlns:a14="http://schemas.microsoft.com/office/drawing/2010/main" w="9525">
                   <a:solidFill>
                     <a:srgbClr val="000000"/>
                   </a:solidFill>
@@ -1281,7 +1728,7 @@
             </a:ln>
             <a:extLst>
               <a:ext uri="{91240B29-F687-4f45-9708-019B960494DF}">
-                <a14:hiddenLine xmlns:a14="http://schemas.microsoft.com/office/drawing/2010/main" xmlns="" w="9525">
+                <a14:hiddenLine xmlns="" xmlns:a14="http://schemas.microsoft.com/office/drawing/2010/main" w="9525">
                   <a:solidFill>
                     <a:srgbClr val="000000"/>
                   </a:solidFill>
@@ -1371,7 +1818,7 @@
             </a:ln>
             <a:extLst>
               <a:ext uri="{91240B29-F687-4f45-9708-019B960494DF}">
-                <a14:hiddenLine xmlns:a14="http://schemas.microsoft.com/office/drawing/2010/main" xmlns="" w="9525">
+                <a14:hiddenLine xmlns="" xmlns:a14="http://schemas.microsoft.com/office/drawing/2010/main" w="9525">
                   <a:solidFill>
                     <a:srgbClr val="000000"/>
                   </a:solidFill>
@@ -1461,7 +1908,7 @@
             </a:ln>
             <a:extLst>
               <a:ext uri="{91240B29-F687-4f45-9708-019B960494DF}">
-                <a14:hiddenLine xmlns:a14="http://schemas.microsoft.com/office/drawing/2010/main" xmlns="" w="9525">
+                <a14:hiddenLine xmlns="" xmlns:a14="http://schemas.microsoft.com/office/drawing/2010/main" w="9525">
                   <a:solidFill>
                     <a:srgbClr val="000000"/>
                   </a:solidFill>
@@ -1523,7 +1970,7 @@
             </a:ln>
             <a:extLst>
               <a:ext uri="{91240B29-F687-4f45-9708-019B960494DF}">
-                <a14:hiddenLine xmlns:a14="http://schemas.microsoft.com/office/drawing/2010/main" xmlns="" w="9525">
+                <a14:hiddenLine xmlns="" xmlns:a14="http://schemas.microsoft.com/office/drawing/2010/main" w="9525">
                   <a:solidFill>
                     <a:srgbClr val="000000"/>
                   </a:solidFill>
@@ -1613,7 +2060,7 @@
             </a:ln>
             <a:extLst>
               <a:ext uri="{91240B29-F687-4f45-9708-019B960494DF}">
-                <a14:hiddenLine xmlns:a14="http://schemas.microsoft.com/office/drawing/2010/main" xmlns="" w="9525">
+                <a14:hiddenLine xmlns="" xmlns:a14="http://schemas.microsoft.com/office/drawing/2010/main" w="9525">
                   <a:solidFill>
                     <a:srgbClr val="000000"/>
                   </a:solidFill>
@@ -1703,7 +2150,7 @@
             </a:ln>
             <a:extLst>
               <a:ext uri="{91240B29-F687-4f45-9708-019B960494DF}">
-                <a14:hiddenLine xmlns:a14="http://schemas.microsoft.com/office/drawing/2010/main" xmlns="" w="9525">
+                <a14:hiddenLine xmlns="" xmlns:a14="http://schemas.microsoft.com/office/drawing/2010/main" w="9525">
                   <a:solidFill>
                     <a:srgbClr val="000000"/>
                   </a:solidFill>
@@ -1759,7 +2206,7 @@
             </a:ln>
             <a:extLst>
               <a:ext uri="{91240B29-F687-4f45-9708-019B960494DF}">
-                <a14:hiddenLine xmlns:a14="http://schemas.microsoft.com/office/drawing/2010/main" xmlns="" w="9525">
+                <a14:hiddenLine xmlns="" xmlns:a14="http://schemas.microsoft.com/office/drawing/2010/main" w="9525">
                   <a:solidFill>
                     <a:srgbClr val="000000"/>
                   </a:solidFill>
@@ -1849,7 +2296,7 @@
             </a:ln>
             <a:extLst>
               <a:ext uri="{91240B29-F687-4f45-9708-019B960494DF}">
-                <a14:hiddenLine xmlns:a14="http://schemas.microsoft.com/office/drawing/2010/main" xmlns="" w="9525">
+                <a14:hiddenLine xmlns="" xmlns:a14="http://schemas.microsoft.com/office/drawing/2010/main" w="9525">
                   <a:solidFill>
                     <a:srgbClr val="000000"/>
                   </a:solidFill>
@@ -1905,7 +2352,7 @@
             </a:ln>
             <a:extLst>
               <a:ext uri="{91240B29-F687-4f45-9708-019B960494DF}">
-                <a14:hiddenLine xmlns:a14="http://schemas.microsoft.com/office/drawing/2010/main" xmlns="" w="9525">
+                <a14:hiddenLine xmlns="" xmlns:a14="http://schemas.microsoft.com/office/drawing/2010/main" w="9525">
                   <a:solidFill>
                     <a:srgbClr val="000000"/>
                   </a:solidFill>
@@ -1995,7 +2442,7 @@
             </a:ln>
             <a:extLst>
               <a:ext uri="{91240B29-F687-4f45-9708-019B960494DF}">
-                <a14:hiddenLine xmlns:a14="http://schemas.microsoft.com/office/drawing/2010/main" xmlns="" w="9525">
+                <a14:hiddenLine xmlns="" xmlns:a14="http://schemas.microsoft.com/office/drawing/2010/main" w="9525">
                   <a:solidFill>
                     <a:srgbClr val="000000"/>
                   </a:solidFill>
@@ -2063,7 +2510,7 @@
             </a:ln>
             <a:extLst>
               <a:ext uri="{91240B29-F687-4f45-9708-019B960494DF}">
-                <a14:hiddenLine xmlns:a14="http://schemas.microsoft.com/office/drawing/2010/main" xmlns="" w="9525">
+                <a14:hiddenLine xmlns="" xmlns:a14="http://schemas.microsoft.com/office/drawing/2010/main" w="9525">
                   <a:solidFill>
                     <a:srgbClr val="000000"/>
                   </a:solidFill>
@@ -2153,7 +2600,7 @@
             </a:ln>
             <a:extLst>
               <a:ext uri="{91240B29-F687-4f45-9708-019B960494DF}">
-                <a14:hiddenLine xmlns:a14="http://schemas.microsoft.com/office/drawing/2010/main" xmlns="" w="9525">
+                <a14:hiddenLine xmlns="" xmlns:a14="http://schemas.microsoft.com/office/drawing/2010/main" w="9525">
                   <a:solidFill>
                     <a:srgbClr val="000000"/>
                   </a:solidFill>
@@ -2221,7 +2668,7 @@
             </a:ln>
             <a:extLst>
               <a:ext uri="{91240B29-F687-4f45-9708-019B960494DF}">
-                <a14:hiddenLine xmlns:a14="http://schemas.microsoft.com/office/drawing/2010/main" xmlns="" w="9525">
+                <a14:hiddenLine xmlns="" xmlns:a14="http://schemas.microsoft.com/office/drawing/2010/main" w="9525">
                   <a:solidFill>
                     <a:srgbClr val="000000"/>
                   </a:solidFill>
@@ -2311,7 +2758,7 @@
             </a:ln>
             <a:extLst>
               <a:ext uri="{91240B29-F687-4f45-9708-019B960494DF}">
-                <a14:hiddenLine xmlns:a14="http://schemas.microsoft.com/office/drawing/2010/main" xmlns="" w="9525">
+                <a14:hiddenLine xmlns="" xmlns:a14="http://schemas.microsoft.com/office/drawing/2010/main" w="9525">
                   <a:solidFill>
                     <a:srgbClr val="000000"/>
                   </a:solidFill>
@@ -2345,7 +2792,7 @@
             </a:ln>
             <a:extLst>
               <a:ext uri="{91240B29-F687-4f45-9708-019B960494DF}">
-                <a14:hiddenLine xmlns:a14="http://schemas.microsoft.com/office/drawing/2010/main" xmlns="" w="9525">
+                <a14:hiddenLine xmlns="" xmlns:a14="http://schemas.microsoft.com/office/drawing/2010/main" w="9525">
                   <a:solidFill>
                     <a:srgbClr val="000000"/>
                   </a:solidFill>
@@ -2435,7 +2882,7 @@
             </a:ln>
             <a:extLst>
               <a:ext uri="{91240B29-F687-4f45-9708-019B960494DF}">
-                <a14:hiddenLine xmlns:a14="http://schemas.microsoft.com/office/drawing/2010/main" xmlns="" w="9525">
+                <a14:hiddenLine xmlns="" xmlns:a14="http://schemas.microsoft.com/office/drawing/2010/main" w="9525">
                   <a:solidFill>
                     <a:srgbClr val="000000"/>
                   </a:solidFill>
@@ -2497,7 +2944,7 @@
             </a:ln>
             <a:extLst>
               <a:ext uri="{91240B29-F687-4f45-9708-019B960494DF}">
-                <a14:hiddenLine xmlns:a14="http://schemas.microsoft.com/office/drawing/2010/main" xmlns="" w="9525">
+                <a14:hiddenLine xmlns="" xmlns:a14="http://schemas.microsoft.com/office/drawing/2010/main" w="9525">
                   <a:solidFill>
                     <a:srgbClr val="000000"/>
                   </a:solidFill>
@@ -2559,7 +3006,7 @@
             </a:ln>
             <a:extLst>
               <a:ext uri="{91240B29-F687-4f45-9708-019B960494DF}">
-                <a14:hiddenLine xmlns:a14="http://schemas.microsoft.com/office/drawing/2010/main" xmlns="" w="9525">
+                <a14:hiddenLine xmlns="" xmlns:a14="http://schemas.microsoft.com/office/drawing/2010/main" w="9525">
                   <a:solidFill>
                     <a:srgbClr val="000000"/>
                   </a:solidFill>
@@ -2649,7 +3096,7 @@
             </a:ln>
             <a:extLst>
               <a:ext uri="{91240B29-F687-4f45-9708-019B960494DF}">
-                <a14:hiddenLine xmlns:a14="http://schemas.microsoft.com/office/drawing/2010/main" xmlns="" w="9525">
+                <a14:hiddenLine xmlns="" xmlns:a14="http://schemas.microsoft.com/office/drawing/2010/main" w="9525">
                   <a:solidFill>
                     <a:srgbClr val="000000"/>
                   </a:solidFill>
@@ -2717,7 +3164,7 @@
             </a:ln>
             <a:extLst>
               <a:ext uri="{91240B29-F687-4f45-9708-019B960494DF}">
-                <a14:hiddenLine xmlns:a14="http://schemas.microsoft.com/office/drawing/2010/main" xmlns="" w="9525">
+                <a14:hiddenLine xmlns="" xmlns:a14="http://schemas.microsoft.com/office/drawing/2010/main" w="9525">
                   <a:solidFill>
                     <a:srgbClr val="000000"/>
                   </a:solidFill>
@@ -2779,7 +3226,7 @@
             </a:ln>
             <a:extLst>
               <a:ext uri="{91240B29-F687-4f45-9708-019B960494DF}">
-                <a14:hiddenLine xmlns:a14="http://schemas.microsoft.com/office/drawing/2010/main" xmlns="" w="9525">
+                <a14:hiddenLine xmlns="" xmlns:a14="http://schemas.microsoft.com/office/drawing/2010/main" w="9525">
                   <a:solidFill>
                     <a:srgbClr val="000000"/>
                   </a:solidFill>
@@ -2869,7 +3316,7 @@
             </a:ln>
             <a:extLst>
               <a:ext uri="{91240B29-F687-4f45-9708-019B960494DF}">
-                <a14:hiddenLine xmlns:a14="http://schemas.microsoft.com/office/drawing/2010/main" xmlns="" w="9525">
+                <a14:hiddenLine xmlns="" xmlns:a14="http://schemas.microsoft.com/office/drawing/2010/main" w="9525">
                   <a:solidFill>
                     <a:srgbClr val="000000"/>
                   </a:solidFill>
@@ -2931,7 +3378,7 @@
             </a:ln>
             <a:extLst>
               <a:ext uri="{91240B29-F687-4f45-9708-019B960494DF}">
-                <a14:hiddenLine xmlns:a14="http://schemas.microsoft.com/office/drawing/2010/main" xmlns="" w="9525">
+                <a14:hiddenLine xmlns="" xmlns:a14="http://schemas.microsoft.com/office/drawing/2010/main" w="9525">
                   <a:solidFill>
                     <a:srgbClr val="000000"/>
                   </a:solidFill>
@@ -3021,7 +3468,7 @@
             </a:ln>
             <a:extLst>
               <a:ext uri="{91240B29-F687-4f45-9708-019B960494DF}">
-                <a14:hiddenLine xmlns:a14="http://schemas.microsoft.com/office/drawing/2010/main" xmlns="" w="9525">
+                <a14:hiddenLine xmlns="" xmlns:a14="http://schemas.microsoft.com/office/drawing/2010/main" w="9525">
                   <a:solidFill>
                     <a:srgbClr val="000000"/>
                   </a:solidFill>
@@ -3083,7 +3530,7 @@
             </a:ln>
             <a:extLst>
               <a:ext uri="{91240B29-F687-4f45-9708-019B960494DF}">
-                <a14:hiddenLine xmlns:a14="http://schemas.microsoft.com/office/drawing/2010/main" xmlns="" w="9525">
+                <a14:hiddenLine xmlns="" xmlns:a14="http://schemas.microsoft.com/office/drawing/2010/main" w="9525">
                   <a:solidFill>
                     <a:srgbClr val="000000"/>
                   </a:solidFill>
@@ -3173,7 +3620,7 @@
             </a:ln>
             <a:extLst>
               <a:ext uri="{91240B29-F687-4f45-9708-019B960494DF}">
-                <a14:hiddenLine xmlns:a14="http://schemas.microsoft.com/office/drawing/2010/main" xmlns="" w="9525">
+                <a14:hiddenLine xmlns="" xmlns:a14="http://schemas.microsoft.com/office/drawing/2010/main" w="9525">
                   <a:solidFill>
                     <a:srgbClr val="000000"/>
                   </a:solidFill>
@@ -3207,7 +3654,7 @@
             </a:ln>
             <a:extLst>
               <a:ext uri="{91240B29-F687-4f45-9708-019B960494DF}">
-                <a14:hiddenLine xmlns:a14="http://schemas.microsoft.com/office/drawing/2010/main" xmlns="" w="9525">
+                <a14:hiddenLine xmlns="" xmlns:a14="http://schemas.microsoft.com/office/drawing/2010/main" w="9525">
                   <a:solidFill>
                     <a:srgbClr val="000000"/>
                   </a:solidFill>
@@ -3272,7 +3719,7 @@
             </a:ln>
             <a:extLst>
               <a:ext uri="{91240B29-F687-4f45-9708-019B960494DF}">
-                <a14:hiddenLine xmlns:a14="http://schemas.microsoft.com/office/drawing/2010/main" xmlns="" w="9525">
+                <a14:hiddenLine xmlns="" xmlns:a14="http://schemas.microsoft.com/office/drawing/2010/main" w="9525">
                   <a:solidFill>
                     <a:srgbClr val="000000"/>
                   </a:solidFill>
@@ -3362,7 +3809,7 @@
             </a:ln>
             <a:extLst>
               <a:ext uri="{91240B29-F687-4f45-9708-019B960494DF}">
-                <a14:hiddenLine xmlns:a14="http://schemas.microsoft.com/office/drawing/2010/main" xmlns="" w="9525">
+                <a14:hiddenLine xmlns="" xmlns:a14="http://schemas.microsoft.com/office/drawing/2010/main" w="9525">
                   <a:solidFill>
                     <a:srgbClr val="000000"/>
                   </a:solidFill>
@@ -3424,7 +3871,7 @@
             </a:ln>
             <a:extLst>
               <a:ext uri="{91240B29-F687-4f45-9708-019B960494DF}">
-                <a14:hiddenLine xmlns:a14="http://schemas.microsoft.com/office/drawing/2010/main" xmlns="" w="9525">
+                <a14:hiddenLine xmlns="" xmlns:a14="http://schemas.microsoft.com/office/drawing/2010/main" w="9525">
                   <a:solidFill>
                     <a:srgbClr val="000000"/>
                   </a:solidFill>
@@ -3514,7 +3961,7 @@
             </a:ln>
             <a:extLst>
               <a:ext uri="{91240B29-F687-4f45-9708-019B960494DF}">
-                <a14:hiddenLine xmlns:a14="http://schemas.microsoft.com/office/drawing/2010/main" xmlns="" w="9525">
+                <a14:hiddenLine xmlns="" xmlns:a14="http://schemas.microsoft.com/office/drawing/2010/main" w="9525">
                   <a:solidFill>
                     <a:srgbClr val="000000"/>
                   </a:solidFill>
@@ -3604,7 +4051,7 @@
             </a:ln>
             <a:extLst>
               <a:ext uri="{91240B29-F687-4f45-9708-019B960494DF}">
-                <a14:hiddenLine xmlns:a14="http://schemas.microsoft.com/office/drawing/2010/main" xmlns="" w="9525">
+                <a14:hiddenLine xmlns="" xmlns:a14="http://schemas.microsoft.com/office/drawing/2010/main" w="9525">
                   <a:solidFill>
                     <a:srgbClr val="000000"/>
                   </a:solidFill>
@@ -3669,7 +4116,7 @@
             </a:ln>
             <a:extLst>
               <a:ext uri="{91240B29-F687-4f45-9708-019B960494DF}">
-                <a14:hiddenLine xmlns:a14="http://schemas.microsoft.com/office/drawing/2010/main" xmlns="" w="9525">
+                <a14:hiddenLine xmlns="" xmlns:a14="http://schemas.microsoft.com/office/drawing/2010/main" w="9525">
                   <a:solidFill>
                     <a:srgbClr val="000000"/>
                   </a:solidFill>
@@ -3731,7 +4178,7 @@
             </a:ln>
             <a:extLst>
               <a:ext uri="{91240B29-F687-4f45-9708-019B960494DF}">
-                <a14:hiddenLine xmlns:a14="http://schemas.microsoft.com/office/drawing/2010/main" xmlns="" w="9525">
+                <a14:hiddenLine xmlns="" xmlns:a14="http://schemas.microsoft.com/office/drawing/2010/main" w="9525">
                   <a:solidFill>
                     <a:srgbClr val="000000"/>
                   </a:solidFill>
@@ -3821,7 +4268,7 @@
             </a:ln>
             <a:extLst>
               <a:ext uri="{91240B29-F687-4f45-9708-019B960494DF}">
-                <a14:hiddenLine xmlns:a14="http://schemas.microsoft.com/office/drawing/2010/main" xmlns="" w="9525">
+                <a14:hiddenLine xmlns="" xmlns:a14="http://schemas.microsoft.com/office/drawing/2010/main" w="9525">
                   <a:solidFill>
                     <a:srgbClr val="000000"/>
                   </a:solidFill>
@@ -3911,7 +4358,7 @@
             </a:ln>
             <a:extLst>
               <a:ext uri="{91240B29-F687-4f45-9708-019B960494DF}">
-                <a14:hiddenLine xmlns:a14="http://schemas.microsoft.com/office/drawing/2010/main" xmlns="" w="9525">
+                <a14:hiddenLine xmlns="" xmlns:a14="http://schemas.microsoft.com/office/drawing/2010/main" w="9525">
                   <a:solidFill>
                     <a:srgbClr val="000000"/>
                   </a:solidFill>
@@ -3973,7 +4420,7 @@
             </a:ln>
             <a:extLst>
               <a:ext uri="{91240B29-F687-4f45-9708-019B960494DF}">
-                <a14:hiddenLine xmlns:a14="http://schemas.microsoft.com/office/drawing/2010/main" xmlns="" w="9525">
+                <a14:hiddenLine xmlns="" xmlns:a14="http://schemas.microsoft.com/office/drawing/2010/main" w="9525">
                   <a:solidFill>
                     <a:srgbClr val="000000"/>
                   </a:solidFill>
@@ -4093,7 +4540,7 @@
             </a:ln>
             <a:extLst>
               <a:ext uri="{91240B29-F687-4f45-9708-019B960494DF}">
-                <a14:hiddenLine xmlns:a14="http://schemas.microsoft.com/office/drawing/2010/main" xmlns="" w="9525">
+                <a14:hiddenLine xmlns="" xmlns:a14="http://schemas.microsoft.com/office/drawing/2010/main" w="9525">
                   <a:solidFill>
                     <a:srgbClr val="000000"/>
                   </a:solidFill>
@@ -4161,7 +4608,7 @@
             </a:ln>
             <a:extLst>
               <a:ext uri="{91240B29-F687-4f45-9708-019B960494DF}">
-                <a14:hiddenLine xmlns:a14="http://schemas.microsoft.com/office/drawing/2010/main" xmlns="" w="9525">
+                <a14:hiddenLine xmlns="" xmlns:a14="http://schemas.microsoft.com/office/drawing/2010/main" w="9525">
                   <a:solidFill>
                     <a:srgbClr val="000000"/>
                   </a:solidFill>
@@ -4251,7 +4698,7 @@
             </a:ln>
             <a:extLst>
               <a:ext uri="{91240B29-F687-4f45-9708-019B960494DF}">
-                <a14:hiddenLine xmlns:a14="http://schemas.microsoft.com/office/drawing/2010/main" xmlns="" w="9525">
+                <a14:hiddenLine xmlns="" xmlns:a14="http://schemas.microsoft.com/office/drawing/2010/main" w="9525">
                   <a:solidFill>
                     <a:srgbClr val="000000"/>
                   </a:solidFill>
@@ -8980,7 +9427,7 @@
           <a:noFill/>
           <a:extLst>
             <a:ext uri="{909E8E84-426E-40dd-AFC4-6F175D3DCCD1}">
-              <a14:hiddenFill xmlns:a14="http://schemas.microsoft.com/office/drawing/2010/main" xmlns="">
+              <a14:hiddenFill xmlns="" xmlns:a14="http://schemas.microsoft.com/office/drawing/2010/main">
                 <a:solidFill>
                   <a:srgbClr val="FFFFFF"/>
                 </a:solidFill>
@@ -9054,7 +9501,7 @@
               </a:ln>
               <a:extLst>
                 <a:ext uri="{91240B29-F687-4f45-9708-019B960494DF}">
-                  <a14:hiddenLine xmlns:a14="http://schemas.microsoft.com/office/drawing/2010/main" xmlns="" w="9525">
+                  <a14:hiddenLine xmlns="" xmlns:a14="http://schemas.microsoft.com/office/drawing/2010/main" w="9525">
                     <a:solidFill>
                       <a:srgbClr val="000000"/>
                     </a:solidFill>
@@ -9144,7 +9591,7 @@
               </a:ln>
               <a:extLst>
                 <a:ext uri="{91240B29-F687-4f45-9708-019B960494DF}">
-                  <a14:hiddenLine xmlns:a14="http://schemas.microsoft.com/office/drawing/2010/main" xmlns="" w="9525">
+                  <a14:hiddenLine xmlns="" xmlns:a14="http://schemas.microsoft.com/office/drawing/2010/main" w="9525">
                     <a:solidFill>
                       <a:srgbClr val="000000"/>
                     </a:solidFill>
@@ -9234,7 +9681,7 @@
               </a:ln>
               <a:extLst>
                 <a:ext uri="{91240B29-F687-4f45-9708-019B960494DF}">
-                  <a14:hiddenLine xmlns:a14="http://schemas.microsoft.com/office/drawing/2010/main" xmlns="" w="9525">
+                  <a14:hiddenLine xmlns="" xmlns:a14="http://schemas.microsoft.com/office/drawing/2010/main" w="9525">
                     <a:solidFill>
                       <a:srgbClr val="000000"/>
                     </a:solidFill>
@@ -9296,7 +9743,7 @@
               </a:ln>
               <a:extLst>
                 <a:ext uri="{91240B29-F687-4f45-9708-019B960494DF}">
-                  <a14:hiddenLine xmlns:a14="http://schemas.microsoft.com/office/drawing/2010/main" xmlns="" w="9525">
+                  <a14:hiddenLine xmlns="" xmlns:a14="http://schemas.microsoft.com/office/drawing/2010/main" w="9525">
                     <a:solidFill>
                       <a:srgbClr val="000000"/>
                     </a:solidFill>
@@ -9386,7 +9833,7 @@
               </a:ln>
               <a:extLst>
                 <a:ext uri="{91240B29-F687-4f45-9708-019B960494DF}">
-                  <a14:hiddenLine xmlns:a14="http://schemas.microsoft.com/office/drawing/2010/main" xmlns="" w="9525">
+                  <a14:hiddenLine xmlns="" xmlns:a14="http://schemas.microsoft.com/office/drawing/2010/main" w="9525">
                     <a:solidFill>
                       <a:srgbClr val="000000"/>
                     </a:solidFill>
@@ -9448,7 +9895,7 @@
               </a:ln>
               <a:extLst>
                 <a:ext uri="{91240B29-F687-4f45-9708-019B960494DF}">
-                  <a14:hiddenLine xmlns:a14="http://schemas.microsoft.com/office/drawing/2010/main" xmlns="" w="9525">
+                  <a14:hiddenLine xmlns="" xmlns:a14="http://schemas.microsoft.com/office/drawing/2010/main" w="9525">
                     <a:solidFill>
                       <a:srgbClr val="000000"/>
                     </a:solidFill>
@@ -9510,7 +9957,7 @@
               </a:ln>
               <a:extLst>
                 <a:ext uri="{91240B29-F687-4f45-9708-019B960494DF}">
-                  <a14:hiddenLine xmlns:a14="http://schemas.microsoft.com/office/drawing/2010/main" xmlns="" w="9525">
+                  <a14:hiddenLine xmlns="" xmlns:a14="http://schemas.microsoft.com/office/drawing/2010/main" w="9525">
                     <a:solidFill>
                       <a:srgbClr val="000000"/>
                     </a:solidFill>
@@ -9600,7 +10047,7 @@
               </a:ln>
               <a:extLst>
                 <a:ext uri="{91240B29-F687-4f45-9708-019B960494DF}">
-                  <a14:hiddenLine xmlns:a14="http://schemas.microsoft.com/office/drawing/2010/main" xmlns="" w="9525">
+                  <a14:hiddenLine xmlns="" xmlns:a14="http://schemas.microsoft.com/office/drawing/2010/main" w="9525">
                     <a:solidFill>
                       <a:srgbClr val="000000"/>
                     </a:solidFill>
@@ -9690,7 +10137,7 @@
               </a:ln>
               <a:extLst>
                 <a:ext uri="{91240B29-F687-4f45-9708-019B960494DF}">
-                  <a14:hiddenLine xmlns:a14="http://schemas.microsoft.com/office/drawing/2010/main" xmlns="" w="9525">
+                  <a14:hiddenLine xmlns="" xmlns:a14="http://schemas.microsoft.com/office/drawing/2010/main" w="9525">
                     <a:solidFill>
                       <a:srgbClr val="000000"/>
                     </a:solidFill>
@@ -9752,7 +10199,7 @@
               </a:ln>
               <a:extLst>
                 <a:ext uri="{91240B29-F687-4f45-9708-019B960494DF}">
-                  <a14:hiddenLine xmlns:a14="http://schemas.microsoft.com/office/drawing/2010/main" xmlns="" w="9525">
+                  <a14:hiddenLine xmlns="" xmlns:a14="http://schemas.microsoft.com/office/drawing/2010/main" w="9525">
                     <a:solidFill>
                       <a:srgbClr val="000000"/>
                     </a:solidFill>
@@ -9862,7 +10309,7 @@
               </a:ln>
               <a:extLst>
                 <a:ext uri="{91240B29-F687-4f45-9708-019B960494DF}">
-                  <a14:hiddenLine xmlns:a14="http://schemas.microsoft.com/office/drawing/2010/main" xmlns="" w="9525">
+                  <a14:hiddenLine xmlns="" xmlns:a14="http://schemas.microsoft.com/office/drawing/2010/main" w="9525">
                     <a:solidFill>
                       <a:srgbClr val="000000"/>
                     </a:solidFill>
@@ -9946,7 +10393,7 @@
               </a:ln>
               <a:extLst>
                 <a:ext uri="{91240B29-F687-4f45-9708-019B960494DF}">
-                  <a14:hiddenLine xmlns:a14="http://schemas.microsoft.com/office/drawing/2010/main" xmlns="" w="9525">
+                  <a14:hiddenLine xmlns="" xmlns:a14="http://schemas.microsoft.com/office/drawing/2010/main" w="9525">
                     <a:solidFill>
                       <a:srgbClr val="000000"/>
                     </a:solidFill>
@@ -10008,7 +10455,7 @@
               </a:ln>
               <a:extLst>
                 <a:ext uri="{91240B29-F687-4f45-9708-019B960494DF}">
-                  <a14:hiddenLine xmlns:a14="http://schemas.microsoft.com/office/drawing/2010/main" xmlns="" w="9525">
+                  <a14:hiddenLine xmlns="" xmlns:a14="http://schemas.microsoft.com/office/drawing/2010/main" w="9525">
                     <a:solidFill>
                       <a:srgbClr val="000000"/>
                     </a:solidFill>
@@ -10070,7 +10517,7 @@
               </a:ln>
               <a:extLst>
                 <a:ext uri="{91240B29-F687-4f45-9708-019B960494DF}">
-                  <a14:hiddenLine xmlns:a14="http://schemas.microsoft.com/office/drawing/2010/main" xmlns="" w="9525">
+                  <a14:hiddenLine xmlns="" xmlns:a14="http://schemas.microsoft.com/office/drawing/2010/main" w="9525">
                     <a:solidFill>
                       <a:srgbClr val="000000"/>
                     </a:solidFill>
@@ -10160,7 +10607,7 @@
               </a:ln>
               <a:extLst>
                 <a:ext uri="{91240B29-F687-4f45-9708-019B960494DF}">
-                  <a14:hiddenLine xmlns:a14="http://schemas.microsoft.com/office/drawing/2010/main" xmlns="" w="9525">
+                  <a14:hiddenLine xmlns="" xmlns:a14="http://schemas.microsoft.com/office/drawing/2010/main" w="9525">
                     <a:solidFill>
                       <a:srgbClr val="000000"/>
                     </a:solidFill>
@@ -10194,7 +10641,7 @@
               </a:ln>
               <a:extLst>
                 <a:ext uri="{91240B29-F687-4f45-9708-019B960494DF}">
-                  <a14:hiddenLine xmlns:a14="http://schemas.microsoft.com/office/drawing/2010/main" xmlns="" w="9525">
+                  <a14:hiddenLine xmlns="" xmlns:a14="http://schemas.microsoft.com/office/drawing/2010/main" w="9525">
                     <a:solidFill>
                       <a:srgbClr val="000000"/>
                     </a:solidFill>
@@ -10259,7 +10706,7 @@
               </a:ln>
               <a:extLst>
                 <a:ext uri="{91240B29-F687-4f45-9708-019B960494DF}">
-                  <a14:hiddenLine xmlns:a14="http://schemas.microsoft.com/office/drawing/2010/main" xmlns="" w="9525">
+                  <a14:hiddenLine xmlns="" xmlns:a14="http://schemas.microsoft.com/office/drawing/2010/main" w="9525">
                     <a:solidFill>
                       <a:srgbClr val="000000"/>
                     </a:solidFill>
@@ -10349,7 +10796,7 @@
               </a:ln>
               <a:extLst>
                 <a:ext uri="{91240B29-F687-4f45-9708-019B960494DF}">
-                  <a14:hiddenLine xmlns:a14="http://schemas.microsoft.com/office/drawing/2010/main" xmlns="" w="9525">
+                  <a14:hiddenLine xmlns="" xmlns:a14="http://schemas.microsoft.com/office/drawing/2010/main" w="9525">
                     <a:solidFill>
                       <a:srgbClr val="000000"/>
                     </a:solidFill>
@@ -10411,7 +10858,7 @@
               </a:ln>
               <a:extLst>
                 <a:ext uri="{91240B29-F687-4f45-9708-019B960494DF}">
-                  <a14:hiddenLine xmlns:a14="http://schemas.microsoft.com/office/drawing/2010/main" xmlns="" w="9525">
+                  <a14:hiddenLine xmlns="" xmlns:a14="http://schemas.microsoft.com/office/drawing/2010/main" w="9525">
                     <a:solidFill>
                       <a:srgbClr val="000000"/>
                     </a:solidFill>
@@ -10501,7 +10948,7 @@
               </a:ln>
               <a:extLst>
                 <a:ext uri="{91240B29-F687-4f45-9708-019B960494DF}">
-                  <a14:hiddenLine xmlns:a14="http://schemas.microsoft.com/office/drawing/2010/main" xmlns="" w="9525">
+                  <a14:hiddenLine xmlns="" xmlns:a14="http://schemas.microsoft.com/office/drawing/2010/main" w="9525">
                     <a:solidFill>
                       <a:srgbClr val="000000"/>
                     </a:solidFill>
@@ -10566,7 +11013,7 @@
               </a:ln>
               <a:extLst>
                 <a:ext uri="{91240B29-F687-4f45-9708-019B960494DF}">
-                  <a14:hiddenLine xmlns:a14="http://schemas.microsoft.com/office/drawing/2010/main" xmlns="" w="9525">
+                  <a14:hiddenLine xmlns="" xmlns:a14="http://schemas.microsoft.com/office/drawing/2010/main" w="9525">
                     <a:solidFill>
                       <a:srgbClr val="000000"/>
                     </a:solidFill>
@@ -10628,7 +11075,7 @@
               </a:ln>
               <a:extLst>
                 <a:ext uri="{91240B29-F687-4f45-9708-019B960494DF}">
-                  <a14:hiddenLine xmlns:a14="http://schemas.microsoft.com/office/drawing/2010/main" xmlns="" w="9525">
+                  <a14:hiddenLine xmlns="" xmlns:a14="http://schemas.microsoft.com/office/drawing/2010/main" w="9525">
                     <a:solidFill>
                       <a:srgbClr val="000000"/>
                     </a:solidFill>
@@ -10718,7 +11165,7 @@
               </a:ln>
               <a:extLst>
                 <a:ext uri="{91240B29-F687-4f45-9708-019B960494DF}">
-                  <a14:hiddenLine xmlns:a14="http://schemas.microsoft.com/office/drawing/2010/main" xmlns="" w="9525">
+                  <a14:hiddenLine xmlns="" xmlns:a14="http://schemas.microsoft.com/office/drawing/2010/main" w="9525">
                     <a:solidFill>
                       <a:srgbClr val="000000"/>
                     </a:solidFill>
@@ -10808,7 +11255,7 @@
               </a:ln>
               <a:extLst>
                 <a:ext uri="{91240B29-F687-4f45-9708-019B960494DF}">
-                  <a14:hiddenLine xmlns:a14="http://schemas.microsoft.com/office/drawing/2010/main" xmlns="" w="9525">
+                  <a14:hiddenLine xmlns="" xmlns:a14="http://schemas.microsoft.com/office/drawing/2010/main" w="9525">
                     <a:solidFill>
                       <a:srgbClr val="000000"/>
                     </a:solidFill>
@@ -10873,7 +11320,7 @@
               </a:ln>
               <a:extLst>
                 <a:ext uri="{91240B29-F687-4f45-9708-019B960494DF}">
-                  <a14:hiddenLine xmlns:a14="http://schemas.microsoft.com/office/drawing/2010/main" xmlns="" w="9525">
+                  <a14:hiddenLine xmlns="" xmlns:a14="http://schemas.microsoft.com/office/drawing/2010/main" w="9525">
                     <a:solidFill>
                       <a:srgbClr val="000000"/>
                     </a:solidFill>
@@ -10993,7 +11440,7 @@
               </a:ln>
               <a:extLst>
                 <a:ext uri="{91240B29-F687-4f45-9708-019B960494DF}">
-                  <a14:hiddenLine xmlns:a14="http://schemas.microsoft.com/office/drawing/2010/main" xmlns="" w="9525">
+                  <a14:hiddenLine xmlns="" xmlns:a14="http://schemas.microsoft.com/office/drawing/2010/main" w="9525">
                     <a:solidFill>
                       <a:srgbClr val="000000"/>
                     </a:solidFill>
@@ -11074,7 +11521,7 @@
               </a:ln>
               <a:extLst>
                 <a:ext uri="{91240B29-F687-4f45-9708-019B960494DF}">
-                  <a14:hiddenLine xmlns:a14="http://schemas.microsoft.com/office/drawing/2010/main" xmlns="" w="9525">
+                  <a14:hiddenLine xmlns="" xmlns:a14="http://schemas.microsoft.com/office/drawing/2010/main" w="9525">
                     <a:solidFill>
                       <a:srgbClr val="000000"/>
                     </a:solidFill>
@@ -11189,7 +11636,7 @@
               </a:ln>
               <a:extLst>
                 <a:ext uri="{91240B29-F687-4f45-9708-019B960494DF}">
-                  <a14:hiddenLine xmlns:a14="http://schemas.microsoft.com/office/drawing/2010/main" xmlns="" w="9525">
+                  <a14:hiddenLine xmlns="" xmlns:a14="http://schemas.microsoft.com/office/drawing/2010/main" w="9525">
                     <a:solidFill>
                       <a:srgbClr val="000000"/>
                     </a:solidFill>
@@ -11279,7 +11726,7 @@
               </a:ln>
               <a:extLst>
                 <a:ext uri="{91240B29-F687-4f45-9708-019B960494DF}">
-                  <a14:hiddenLine xmlns:a14="http://schemas.microsoft.com/office/drawing/2010/main" xmlns="" w="9525">
+                  <a14:hiddenLine xmlns="" xmlns:a14="http://schemas.microsoft.com/office/drawing/2010/main" w="9525">
                     <a:solidFill>
                       <a:srgbClr val="000000"/>
                     </a:solidFill>
@@ -11344,7 +11791,7 @@
               </a:ln>
               <a:extLst>
                 <a:ext uri="{91240B29-F687-4f45-9708-019B960494DF}">
-                  <a14:hiddenLine xmlns:a14="http://schemas.microsoft.com/office/drawing/2010/main" xmlns="" w="9525">
+                  <a14:hiddenLine xmlns="" xmlns:a14="http://schemas.microsoft.com/office/drawing/2010/main" w="9525">
                     <a:solidFill>
                       <a:srgbClr val="000000"/>
                     </a:solidFill>
@@ -11434,7 +11881,7 @@
               </a:ln>
               <a:extLst>
                 <a:ext uri="{91240B29-F687-4f45-9708-019B960494DF}">
-                  <a14:hiddenLine xmlns:a14="http://schemas.microsoft.com/office/drawing/2010/main" xmlns="" w="9525">
+                  <a14:hiddenLine xmlns="" xmlns:a14="http://schemas.microsoft.com/office/drawing/2010/main" w="9525">
                     <a:solidFill>
                       <a:srgbClr val="000000"/>
                     </a:solidFill>
@@ -11502,7 +11949,7 @@
               </a:ln>
               <a:extLst>
                 <a:ext uri="{91240B29-F687-4f45-9708-019B960494DF}">
-                  <a14:hiddenLine xmlns:a14="http://schemas.microsoft.com/office/drawing/2010/main" xmlns="" w="9525">
+                  <a14:hiddenLine xmlns="" xmlns:a14="http://schemas.microsoft.com/office/drawing/2010/main" w="9525">
                     <a:solidFill>
                       <a:srgbClr val="000000"/>
                     </a:solidFill>
@@ -11592,7 +12039,7 @@
               </a:ln>
               <a:extLst>
                 <a:ext uri="{91240B29-F687-4f45-9708-019B960494DF}">
-                  <a14:hiddenLine xmlns:a14="http://schemas.microsoft.com/office/drawing/2010/main" xmlns="" w="9525">
+                  <a14:hiddenLine xmlns="" xmlns:a14="http://schemas.microsoft.com/office/drawing/2010/main" w="9525">
                     <a:solidFill>
                       <a:srgbClr val="000000"/>
                     </a:solidFill>
@@ -11660,7 +12107,7 @@
               </a:ln>
               <a:extLst>
                 <a:ext uri="{91240B29-F687-4f45-9708-019B960494DF}">
-                  <a14:hiddenLine xmlns:a14="http://schemas.microsoft.com/office/drawing/2010/main" xmlns="" w="9525">
+                  <a14:hiddenLine xmlns="" xmlns:a14="http://schemas.microsoft.com/office/drawing/2010/main" w="9525">
                     <a:solidFill>
                       <a:srgbClr val="000000"/>
                     </a:solidFill>
@@ -11750,7 +12197,7 @@
               </a:ln>
               <a:extLst>
                 <a:ext uri="{91240B29-F687-4f45-9708-019B960494DF}">
-                  <a14:hiddenLine xmlns:a14="http://schemas.microsoft.com/office/drawing/2010/main" xmlns="" w="9525">
+                  <a14:hiddenLine xmlns="" xmlns:a14="http://schemas.microsoft.com/office/drawing/2010/main" w="9525">
                     <a:solidFill>
                       <a:srgbClr val="000000"/>
                     </a:solidFill>
@@ -11784,7 +12231,7 @@
               </a:ln>
               <a:extLst>
                 <a:ext uri="{91240B29-F687-4f45-9708-019B960494DF}">
-                  <a14:hiddenLine xmlns:a14="http://schemas.microsoft.com/office/drawing/2010/main" xmlns="" w="9525">
+                  <a14:hiddenLine xmlns="" xmlns:a14="http://schemas.microsoft.com/office/drawing/2010/main" w="9525">
                     <a:solidFill>
                       <a:srgbClr val="000000"/>
                     </a:solidFill>
@@ -12482,7 +12929,12 @@
             <p:ph idx="1"/>
           </p:nvPr>
         </p:nvSpPr>
-        <p:spPr/>
+        <p:spPr>
+          <a:xfrm>
+            <a:off x="1141412" y="1561589"/>
+            <a:ext cx="9905999" cy="1617839"/>
+          </a:xfrm>
+        </p:spPr>
         <p:txBody>
           <a:bodyPr/>
           <a:lstStyle/>
@@ -12492,8 +12944,512 @@
               <a:t>Bridge design pattern separates an object’s interface from its implementation</a:t>
             </a:r>
           </a:p>
+          <a:p>
+            <a:r>
+              <a:rPr lang="en-US" dirty="0"/>
+              <a:t>Progressively adding functionality while separating out major differences using abstract classes</a:t>
+            </a:r>
+          </a:p>
         </p:txBody>
       </p:sp>
+      <p:pic>
+        <p:nvPicPr>
+          <p:cNvPr id="1030" name="Picture 6" descr="Image result for tv clipart">
+            <a:extLst>
+              <a:ext uri="{FF2B5EF4-FFF2-40B4-BE49-F238E27FC236}">
+                <a16:creationId xmlns:a16="http://schemas.microsoft.com/office/drawing/2014/main" id="{45DF3747-2F42-49E9-8481-5424AD67ABAE}"/>
+              </a:ext>
+            </a:extLst>
+          </p:cNvPr>
+          <p:cNvPicPr>
+            <a:picLocks noChangeAspect="1" noChangeArrowheads="1"/>
+          </p:cNvPicPr>
+          <p:nvPr/>
+        </p:nvPicPr>
+        <p:blipFill>
+          <a:blip r:embed="rId3">
+            <a:extLst>
+              <a:ext uri="{28A0092B-C50C-407E-A947-70E740481C1C}">
+                <a14:useLocalDpi xmlns:a14="http://schemas.microsoft.com/office/drawing/2010/main" val="0"/>
+              </a:ext>
+            </a:extLst>
+          </a:blip>
+          <a:srcRect/>
+          <a:stretch>
+            <a:fillRect/>
+          </a:stretch>
+        </p:blipFill>
+        <p:spPr bwMode="auto">
+          <a:xfrm>
+            <a:off x="2290196" y="3887607"/>
+            <a:ext cx="1060508" cy="1060508"/>
+          </a:xfrm>
+          <a:prstGeom prst="rect">
+            <a:avLst/>
+          </a:prstGeom>
+          <a:noFill/>
+          <a:extLst>
+            <a:ext uri="{909E8E84-426E-40DD-AFC4-6F175D3DCCD1}">
+              <a14:hiddenFill xmlns:a14="http://schemas.microsoft.com/office/drawing/2010/main">
+                <a:solidFill>
+                  <a:srgbClr val="FFFFFF"/>
+                </a:solidFill>
+              </a14:hiddenFill>
+            </a:ext>
+          </a:extLst>
+        </p:spPr>
+      </p:pic>
+      <p:pic>
+        <p:nvPicPr>
+          <p:cNvPr id="1032" name="Picture 8" descr="Image result for blu ray player clipart">
+            <a:extLst>
+              <a:ext uri="{FF2B5EF4-FFF2-40B4-BE49-F238E27FC236}">
+                <a16:creationId xmlns:a16="http://schemas.microsoft.com/office/drawing/2014/main" id="{D1203B1F-0E43-4EEB-9445-802182B6BB53}"/>
+              </a:ext>
+            </a:extLst>
+          </p:cNvPr>
+          <p:cNvPicPr>
+            <a:picLocks noChangeAspect="1" noChangeArrowheads="1"/>
+          </p:cNvPicPr>
+          <p:nvPr/>
+        </p:nvPicPr>
+        <p:blipFill>
+          <a:blip r:embed="rId4">
+            <a:extLst>
+              <a:ext uri="{28A0092B-C50C-407E-A947-70E740481C1C}">
+                <a14:useLocalDpi xmlns:a14="http://schemas.microsoft.com/office/drawing/2010/main" val="0"/>
+              </a:ext>
+            </a:extLst>
+          </a:blip>
+          <a:srcRect/>
+          <a:stretch>
+            <a:fillRect/>
+          </a:stretch>
+        </p:blipFill>
+        <p:spPr bwMode="auto">
+          <a:xfrm>
+            <a:off x="3951216" y="5221081"/>
+            <a:ext cx="1732136" cy="554825"/>
+          </a:xfrm>
+          <a:prstGeom prst="rect">
+            <a:avLst/>
+          </a:prstGeom>
+          <a:noFill/>
+          <a:extLst>
+            <a:ext uri="{909E8E84-426E-40DD-AFC4-6F175D3DCCD1}">
+              <a14:hiddenFill xmlns:a14="http://schemas.microsoft.com/office/drawing/2010/main">
+                <a:solidFill>
+                  <a:srgbClr val="FFFFFF"/>
+                </a:solidFill>
+              </a14:hiddenFill>
+            </a:ext>
+          </a:extLst>
+        </p:spPr>
+      </p:pic>
+      <p:pic>
+        <p:nvPicPr>
+          <p:cNvPr id="1036" name="Picture 12" descr="Image result for flat screen tv clipart">
+            <a:extLst>
+              <a:ext uri="{FF2B5EF4-FFF2-40B4-BE49-F238E27FC236}">
+                <a16:creationId xmlns:a16="http://schemas.microsoft.com/office/drawing/2014/main" id="{449F95AB-313D-49F3-8E58-9CC84F1A4576}"/>
+              </a:ext>
+            </a:extLst>
+          </p:cNvPr>
+          <p:cNvPicPr>
+            <a:picLocks noChangeAspect="1" noChangeArrowheads="1"/>
+          </p:cNvPicPr>
+          <p:nvPr/>
+        </p:nvPicPr>
+        <p:blipFill>
+          <a:blip r:embed="rId5">
+            <a:extLst>
+              <a:ext uri="{28A0092B-C50C-407E-A947-70E740481C1C}">
+                <a14:useLocalDpi xmlns:a14="http://schemas.microsoft.com/office/drawing/2010/main" val="0"/>
+              </a:ext>
+            </a:extLst>
+          </a:blip>
+          <a:srcRect/>
+          <a:stretch>
+            <a:fillRect/>
+          </a:stretch>
+        </p:blipFill>
+        <p:spPr bwMode="auto">
+          <a:xfrm>
+            <a:off x="4274358" y="3599279"/>
+            <a:ext cx="1085851" cy="814388"/>
+          </a:xfrm>
+          <a:prstGeom prst="rect">
+            <a:avLst/>
+          </a:prstGeom>
+          <a:noFill/>
+          <a:extLst>
+            <a:ext uri="{909E8E84-426E-40DD-AFC4-6F175D3DCCD1}">
+              <a14:hiddenFill xmlns:a14="http://schemas.microsoft.com/office/drawing/2010/main">
+                <a:solidFill>
+                  <a:srgbClr val="FFFFFF"/>
+                </a:solidFill>
+              </a14:hiddenFill>
+            </a:ext>
+          </a:extLst>
+        </p:spPr>
+      </p:pic>
+      <p:pic>
+        <p:nvPicPr>
+          <p:cNvPr id="1070" name="Picture 46" descr="Image result for tv control clipart transparent background">
+            <a:extLst>
+              <a:ext uri="{FF2B5EF4-FFF2-40B4-BE49-F238E27FC236}">
+                <a16:creationId xmlns:a16="http://schemas.microsoft.com/office/drawing/2014/main" id="{84A563FD-CE22-4756-B899-1B41724C5D04}"/>
+              </a:ext>
+            </a:extLst>
+          </p:cNvPr>
+          <p:cNvPicPr>
+            <a:picLocks noChangeAspect="1" noChangeArrowheads="1"/>
+          </p:cNvPicPr>
+          <p:nvPr/>
+        </p:nvPicPr>
+        <p:blipFill>
+          <a:blip r:embed="rId6">
+            <a:extLst>
+              <a:ext uri="{28A0092B-C50C-407E-A947-70E740481C1C}">
+                <a14:useLocalDpi xmlns:a14="http://schemas.microsoft.com/office/drawing/2010/main" val="0"/>
+              </a:ext>
+            </a:extLst>
+          </a:blip>
+          <a:srcRect/>
+          <a:stretch>
+            <a:fillRect/>
+          </a:stretch>
+        </p:blipFill>
+        <p:spPr bwMode="auto">
+          <a:xfrm rot="18907914">
+            <a:off x="6257332" y="3777905"/>
+            <a:ext cx="1041560" cy="1041560"/>
+          </a:xfrm>
+          <a:prstGeom prst="rect">
+            <a:avLst/>
+          </a:prstGeom>
+          <a:noFill/>
+          <a:extLst>
+            <a:ext uri="{909E8E84-426E-40DD-AFC4-6F175D3DCCD1}">
+              <a14:hiddenFill xmlns:a14="http://schemas.microsoft.com/office/drawing/2010/main">
+                <a:solidFill>
+                  <a:srgbClr val="FFFFFF"/>
+                </a:solidFill>
+              </a14:hiddenFill>
+            </a:ext>
+          </a:extLst>
+        </p:spPr>
+      </p:pic>
+      <p:pic>
+        <p:nvPicPr>
+          <p:cNvPr id="31" name="Picture 46" descr="Image result for tv control clipart transparent background">
+            <a:extLst>
+              <a:ext uri="{FF2B5EF4-FFF2-40B4-BE49-F238E27FC236}">
+                <a16:creationId xmlns:a16="http://schemas.microsoft.com/office/drawing/2014/main" id="{B44CC8D5-1888-459F-84FA-12C396B75F96}"/>
+              </a:ext>
+            </a:extLst>
+          </p:cNvPr>
+          <p:cNvPicPr>
+            <a:picLocks noChangeAspect="1" noChangeArrowheads="1"/>
+          </p:cNvPicPr>
+          <p:nvPr/>
+        </p:nvPicPr>
+        <p:blipFill>
+          <a:blip r:embed="rId6">
+            <a:extLst>
+              <a:ext uri="{28A0092B-C50C-407E-A947-70E740481C1C}">
+                <a14:useLocalDpi xmlns:a14="http://schemas.microsoft.com/office/drawing/2010/main" val="0"/>
+              </a:ext>
+            </a:extLst>
+          </a:blip>
+          <a:srcRect/>
+          <a:stretch>
+            <a:fillRect/>
+          </a:stretch>
+        </p:blipFill>
+        <p:spPr bwMode="auto">
+          <a:xfrm rot="18907914">
+            <a:off x="8091233" y="3276634"/>
+            <a:ext cx="877420" cy="877420"/>
+          </a:xfrm>
+          <a:prstGeom prst="rect">
+            <a:avLst/>
+          </a:prstGeom>
+          <a:noFill/>
+          <a:extLst>
+            <a:ext uri="{909E8E84-426E-40DD-AFC4-6F175D3DCCD1}">
+              <a14:hiddenFill xmlns:a14="http://schemas.microsoft.com/office/drawing/2010/main">
+                <a:solidFill>
+                  <a:srgbClr val="FFFFFF"/>
+                </a:solidFill>
+              </a14:hiddenFill>
+            </a:ext>
+          </a:extLst>
+        </p:spPr>
+      </p:pic>
+      <p:sp>
+        <p:nvSpPr>
+          <p:cNvPr id="4" name="TextBox 3">
+            <a:extLst>
+              <a:ext uri="{FF2B5EF4-FFF2-40B4-BE49-F238E27FC236}">
+                <a16:creationId xmlns:a16="http://schemas.microsoft.com/office/drawing/2014/main" id="{113BABE9-6D80-4E1B-9DC6-EEF49E7480BD}"/>
+              </a:ext>
+            </a:extLst>
+          </p:cNvPr>
+          <p:cNvSpPr txBox="1"/>
+          <p:nvPr/>
+        </p:nvSpPr>
+        <p:spPr>
+          <a:xfrm>
+            <a:off x="2130804" y="4907559"/>
+            <a:ext cx="1367405" cy="369332"/>
+          </a:xfrm>
+          <a:prstGeom prst="rect">
+            <a:avLst/>
+          </a:prstGeom>
+          <a:noFill/>
+        </p:spPr>
+        <p:txBody>
+          <a:bodyPr wrap="square" rtlCol="0">
+            <a:spAutoFit/>
+          </a:bodyPr>
+          <a:lstStyle/>
+          <a:p>
+            <a:pPr algn="ctr"/>
+            <a:r>
+              <a:rPr lang="en-US" dirty="0"/>
+              <a:t>Abstract</a:t>
+            </a:r>
+          </a:p>
+        </p:txBody>
+      </p:sp>
+      <p:sp>
+        <p:nvSpPr>
+          <p:cNvPr id="35" name="TextBox 34">
+            <a:extLst>
+              <a:ext uri="{FF2B5EF4-FFF2-40B4-BE49-F238E27FC236}">
+                <a16:creationId xmlns:a16="http://schemas.microsoft.com/office/drawing/2014/main" id="{7C850CD5-9077-4F2D-9901-B5642A9BBFAE}"/>
+              </a:ext>
+            </a:extLst>
+          </p:cNvPr>
+          <p:cNvSpPr txBox="1"/>
+          <p:nvPr/>
+        </p:nvSpPr>
+        <p:spPr>
+          <a:xfrm>
+            <a:off x="4133579" y="5870150"/>
+            <a:ext cx="1367405" cy="369332"/>
+          </a:xfrm>
+          <a:prstGeom prst="rect">
+            <a:avLst/>
+          </a:prstGeom>
+          <a:noFill/>
+        </p:spPr>
+        <p:txBody>
+          <a:bodyPr wrap="square" rtlCol="0">
+            <a:spAutoFit/>
+          </a:bodyPr>
+          <a:lstStyle/>
+          <a:p>
+            <a:pPr algn="ctr"/>
+            <a:r>
+              <a:rPr lang="en-US" dirty="0"/>
+              <a:t>Device 2</a:t>
+            </a:r>
+          </a:p>
+        </p:txBody>
+      </p:sp>
+      <p:sp>
+        <p:nvSpPr>
+          <p:cNvPr id="36" name="TextBox 35">
+            <a:extLst>
+              <a:ext uri="{FF2B5EF4-FFF2-40B4-BE49-F238E27FC236}">
+                <a16:creationId xmlns:a16="http://schemas.microsoft.com/office/drawing/2014/main" id="{7700D1D1-AF4C-4FFB-B3DA-9D96274AECCF}"/>
+              </a:ext>
+            </a:extLst>
+          </p:cNvPr>
+          <p:cNvSpPr txBox="1"/>
+          <p:nvPr/>
+        </p:nvSpPr>
+        <p:spPr>
+          <a:xfrm>
+            <a:off x="4133580" y="4481180"/>
+            <a:ext cx="1367405" cy="369332"/>
+          </a:xfrm>
+          <a:prstGeom prst="rect">
+            <a:avLst/>
+          </a:prstGeom>
+          <a:noFill/>
+        </p:spPr>
+        <p:txBody>
+          <a:bodyPr wrap="square" rtlCol="0">
+            <a:spAutoFit/>
+          </a:bodyPr>
+          <a:lstStyle/>
+          <a:p>
+            <a:pPr algn="ctr"/>
+            <a:r>
+              <a:rPr lang="en-US" dirty="0"/>
+              <a:t>Device 1</a:t>
+            </a:r>
+          </a:p>
+        </p:txBody>
+      </p:sp>
+      <p:sp>
+        <p:nvSpPr>
+          <p:cNvPr id="37" name="TextBox 36">
+            <a:extLst>
+              <a:ext uri="{FF2B5EF4-FFF2-40B4-BE49-F238E27FC236}">
+                <a16:creationId xmlns:a16="http://schemas.microsoft.com/office/drawing/2014/main" id="{DC296CB9-10A0-45C4-9F6E-45F4D9E2812B}"/>
+              </a:ext>
+            </a:extLst>
+          </p:cNvPr>
+          <p:cNvSpPr txBox="1"/>
+          <p:nvPr/>
+        </p:nvSpPr>
+        <p:spPr>
+          <a:xfrm>
+            <a:off x="6094411" y="4850512"/>
+            <a:ext cx="1367405" cy="369332"/>
+          </a:xfrm>
+          <a:prstGeom prst="rect">
+            <a:avLst/>
+          </a:prstGeom>
+          <a:noFill/>
+        </p:spPr>
+        <p:txBody>
+          <a:bodyPr wrap="square" rtlCol="0">
+            <a:spAutoFit/>
+          </a:bodyPr>
+          <a:lstStyle/>
+          <a:p>
+            <a:pPr algn="ctr"/>
+            <a:r>
+              <a:rPr lang="en-US" dirty="0"/>
+              <a:t>Abstract</a:t>
+            </a:r>
+          </a:p>
+        </p:txBody>
+      </p:sp>
+      <p:sp>
+        <p:nvSpPr>
+          <p:cNvPr id="38" name="TextBox 37">
+            <a:extLst>
+              <a:ext uri="{FF2B5EF4-FFF2-40B4-BE49-F238E27FC236}">
+                <a16:creationId xmlns:a16="http://schemas.microsoft.com/office/drawing/2014/main" id="{FB49F1F0-00D2-4AEC-A0B8-B38C139F7488}"/>
+              </a:ext>
+            </a:extLst>
+          </p:cNvPr>
+          <p:cNvSpPr txBox="1"/>
+          <p:nvPr/>
+        </p:nvSpPr>
+        <p:spPr>
+          <a:xfrm>
+            <a:off x="7846506" y="4229001"/>
+            <a:ext cx="1367405" cy="369332"/>
+          </a:xfrm>
+          <a:prstGeom prst="rect">
+            <a:avLst/>
+          </a:prstGeom>
+          <a:noFill/>
+        </p:spPr>
+        <p:txBody>
+          <a:bodyPr wrap="square" rtlCol="0">
+            <a:spAutoFit/>
+          </a:bodyPr>
+          <a:lstStyle/>
+          <a:p>
+            <a:pPr algn="ctr"/>
+            <a:r>
+              <a:rPr lang="en-US" dirty="0"/>
+              <a:t>Remote 1</a:t>
+            </a:r>
+          </a:p>
+        </p:txBody>
+      </p:sp>
+      <p:sp>
+        <p:nvSpPr>
+          <p:cNvPr id="39" name="TextBox 38">
+            <a:extLst>
+              <a:ext uri="{FF2B5EF4-FFF2-40B4-BE49-F238E27FC236}">
+                <a16:creationId xmlns:a16="http://schemas.microsoft.com/office/drawing/2014/main" id="{F0FC3621-3C08-4B36-9297-57BCC25A0212}"/>
+              </a:ext>
+            </a:extLst>
+          </p:cNvPr>
+          <p:cNvSpPr txBox="1"/>
+          <p:nvPr/>
+        </p:nvSpPr>
+        <p:spPr>
+          <a:xfrm>
+            <a:off x="7846506" y="5775906"/>
+            <a:ext cx="1367405" cy="369332"/>
+          </a:xfrm>
+          <a:prstGeom prst="rect">
+            <a:avLst/>
+          </a:prstGeom>
+          <a:noFill/>
+        </p:spPr>
+        <p:txBody>
+          <a:bodyPr wrap="square" rtlCol="0">
+            <a:spAutoFit/>
+          </a:bodyPr>
+          <a:lstStyle/>
+          <a:p>
+            <a:pPr algn="ctr"/>
+            <a:r>
+              <a:rPr lang="en-US" dirty="0"/>
+              <a:t>Remote 2</a:t>
+            </a:r>
+          </a:p>
+        </p:txBody>
+      </p:sp>
+      <p:pic>
+        <p:nvPicPr>
+          <p:cNvPr id="40" name="Picture 46" descr="Image result for tv control clipart transparent background">
+            <a:extLst>
+              <a:ext uri="{FF2B5EF4-FFF2-40B4-BE49-F238E27FC236}">
+                <a16:creationId xmlns:a16="http://schemas.microsoft.com/office/drawing/2014/main" id="{4C7E8DE3-1899-43D4-B3FE-E9594A71EE64}"/>
+              </a:ext>
+            </a:extLst>
+          </p:cNvPr>
+          <p:cNvPicPr>
+            <a:picLocks noChangeAspect="1" noChangeArrowheads="1"/>
+          </p:cNvPicPr>
+          <p:nvPr/>
+        </p:nvPicPr>
+        <p:blipFill>
+          <a:blip r:embed="rId6">
+            <a:extLst>
+              <a:ext uri="{28A0092B-C50C-407E-A947-70E740481C1C}">
+                <a14:useLocalDpi xmlns:a14="http://schemas.microsoft.com/office/drawing/2010/main" val="0"/>
+              </a:ext>
+            </a:extLst>
+          </a:blip>
+          <a:srcRect/>
+          <a:stretch>
+            <a:fillRect/>
+          </a:stretch>
+        </p:blipFill>
+        <p:spPr bwMode="auto">
+          <a:xfrm rot="18907914">
+            <a:off x="8091233" y="4901434"/>
+            <a:ext cx="877420" cy="877420"/>
+          </a:xfrm>
+          <a:prstGeom prst="rect">
+            <a:avLst/>
+          </a:prstGeom>
+          <a:noFill/>
+          <a:extLst>
+            <a:ext uri="{909E8E84-426E-40DD-AFC4-6F175D3DCCD1}">
+              <a14:hiddenFill xmlns:a14="http://schemas.microsoft.com/office/drawing/2010/main">
+                <a:solidFill>
+                  <a:srgbClr val="FFFFFF"/>
+                </a:solidFill>
+              </a14:hiddenFill>
+            </a:ext>
+          </a:extLst>
+        </p:spPr>
+      </p:pic>
     </p:spTree>
     <p:extLst>
       <p:ext uri="{BB962C8B-B14F-4D97-AF65-F5344CB8AC3E}">
@@ -12578,6 +13534,15 @@
                 <a:hlinkClick r:id="rId2"/>
               </a:rPr>
               <a:t>https://sourcemaking.com/design_patterns</a:t>
+            </a:r>
+            <a:endParaRPr lang="en-US" dirty="0"/>
+          </a:p>
+          <a:p>
+            <a:r>
+              <a:rPr lang="en-US" dirty="0">
+                <a:hlinkClick r:id="rId3"/>
+              </a:rPr>
+              <a:t>https://www.youtube.com/watch?v=9jIgSsIfh_8</a:t>
             </a:r>
             <a:endParaRPr lang="en-US" dirty="0"/>
           </a:p>
@@ -12848,4 +13813,299 @@
     </a:ext>
   </a:extLst>
 </a:theme>
+</file>
+
+<file path=ppt/theme/theme2.xml><?xml version="1.0" encoding="utf-8"?>
+<a:theme xmlns:a="http://schemas.openxmlformats.org/drawingml/2006/main" name="Office Theme">
+  <a:themeElements>
+    <a:clrScheme name="Office">
+      <a:dk1>
+        <a:sysClr val="windowText" lastClr="000000"/>
+      </a:dk1>
+      <a:lt1>
+        <a:sysClr val="window" lastClr="FFFFFF"/>
+      </a:lt1>
+      <a:dk2>
+        <a:srgbClr val="44546A"/>
+      </a:dk2>
+      <a:lt2>
+        <a:srgbClr val="E7E6E6"/>
+      </a:lt2>
+      <a:accent1>
+        <a:srgbClr val="4472C4"/>
+      </a:accent1>
+      <a:accent2>
+        <a:srgbClr val="ED7D31"/>
+      </a:accent2>
+      <a:accent3>
+        <a:srgbClr val="A5A5A5"/>
+      </a:accent3>
+      <a:accent4>
+        <a:srgbClr val="FFC000"/>
+      </a:accent4>
+      <a:accent5>
+        <a:srgbClr val="5B9BD5"/>
+      </a:accent5>
+      <a:accent6>
+        <a:srgbClr val="70AD47"/>
+      </a:accent6>
+      <a:hlink>
+        <a:srgbClr val="0563C1"/>
+      </a:hlink>
+      <a:folHlink>
+        <a:srgbClr val="954F72"/>
+      </a:folHlink>
+    </a:clrScheme>
+    <a:fontScheme name="Office">
+      <a:majorFont>
+        <a:latin typeface="Calibri Light" panose="020F0302020204030204"/>
+        <a:ea typeface=""/>
+        <a:cs typeface=""/>
+        <a:font script="Jpan" typeface="游ゴシック Light"/>
+        <a:font script="Hang" typeface="맑은 고딕"/>
+        <a:font script="Hans" typeface="等线 Light"/>
+        <a:font script="Hant" typeface="新細明體"/>
+        <a:font script="Arab" typeface="Times New Roman"/>
+        <a:font script="Hebr" typeface="Times New Roman"/>
+        <a:font script="Thai" typeface="Angsana New"/>
+        <a:font script="Ethi" typeface="Nyala"/>
+        <a:font script="Beng" typeface="Vrinda"/>
+        <a:font script="Gujr" typeface="Shruti"/>
+        <a:font script="Khmr" typeface="MoolBoran"/>
+        <a:font script="Knda" typeface="Tunga"/>
+        <a:font script="Guru" typeface="Raavi"/>
+        <a:font script="Cans" typeface="Euphemia"/>
+        <a:font script="Cher" typeface="Plantagenet Cherokee"/>
+        <a:font script="Yiii" typeface="Microsoft Yi Baiti"/>
+        <a:font script="Tibt" typeface="Microsoft Himalaya"/>
+        <a:font script="Thaa" typeface="MV Boli"/>
+        <a:font script="Deva" typeface="Mangal"/>
+        <a:font script="Telu" typeface="Gautami"/>
+        <a:font script="Taml" typeface="Latha"/>
+        <a:font script="Syrc" typeface="Estrangelo Edessa"/>
+        <a:font script="Orya" typeface="Kalinga"/>
+        <a:font script="Mlym" typeface="Kartika"/>
+        <a:font script="Laoo" typeface="DokChampa"/>
+        <a:font script="Sinh" typeface="Iskoola Pota"/>
+        <a:font script="Mong" typeface="Mongolian Baiti"/>
+        <a:font script="Viet" typeface="Times New Roman"/>
+        <a:font script="Uigh" typeface="Microsoft Uighur"/>
+        <a:font script="Geor" typeface="Sylfaen"/>
+        <a:font script="Armn" typeface="Arial"/>
+        <a:font script="Bugi" typeface="Leelawadee UI"/>
+        <a:font script="Bopo" typeface="Microsoft JhengHei"/>
+        <a:font script="Java" typeface="Javanese Text"/>
+        <a:font script="Lisu" typeface="Segoe UI"/>
+        <a:font script="Mymr" typeface="Myanmar Text"/>
+        <a:font script="Nkoo" typeface="Ebrima"/>
+        <a:font script="Olck" typeface="Nirmala UI"/>
+        <a:font script="Osma" typeface="Ebrima"/>
+        <a:font script="Phag" typeface="Phagspa"/>
+        <a:font script="Syrn" typeface="Estrangelo Edessa"/>
+        <a:font script="Syrj" typeface="Estrangelo Edessa"/>
+        <a:font script="Syre" typeface="Estrangelo Edessa"/>
+        <a:font script="Sora" typeface="Nirmala UI"/>
+        <a:font script="Tale" typeface="Microsoft Tai Le"/>
+        <a:font script="Talu" typeface="Microsoft New Tai Lue"/>
+        <a:font script="Tfng" typeface="Ebrima"/>
+      </a:majorFont>
+      <a:minorFont>
+        <a:latin typeface="Calibri" panose="020F0502020204030204"/>
+        <a:ea typeface=""/>
+        <a:cs typeface=""/>
+        <a:font script="Jpan" typeface="游ゴシック"/>
+        <a:font script="Hang" typeface="맑은 고딕"/>
+        <a:font script="Hans" typeface="等线"/>
+        <a:font script="Hant" typeface="新細明體"/>
+        <a:font script="Arab" typeface="Arial"/>
+        <a:font script="Hebr" typeface="Arial"/>
+        <a:font script="Thai" typeface="Cordia New"/>
+        <a:font script="Ethi" typeface="Nyala"/>
+        <a:font script="Beng" typeface="Vrinda"/>
+        <a:font script="Gujr" typeface="Shruti"/>
+        <a:font script="Khmr" typeface="DaunPenh"/>
+        <a:font script="Knda" typeface="Tunga"/>
+        <a:font script="Guru" typeface="Raavi"/>
+        <a:font script="Cans" typeface="Euphemia"/>
+        <a:font script="Cher" typeface="Plantagenet Cherokee"/>
+        <a:font script="Yiii" typeface="Microsoft Yi Baiti"/>
+        <a:font script="Tibt" typeface="Microsoft Himalaya"/>
+        <a:font script="Thaa" typeface="MV Boli"/>
+        <a:font script="Deva" typeface="Mangal"/>
+        <a:font script="Telu" typeface="Gautami"/>
+        <a:font script="Taml" typeface="Latha"/>
+        <a:font script="Syrc" typeface="Estrangelo Edessa"/>
+        <a:font script="Orya" typeface="Kalinga"/>
+        <a:font script="Mlym" typeface="Kartika"/>
+        <a:font script="Laoo" typeface="DokChampa"/>
+        <a:font script="Sinh" typeface="Iskoola Pota"/>
+        <a:font script="Mong" typeface="Mongolian Baiti"/>
+        <a:font script="Viet" typeface="Arial"/>
+        <a:font script="Uigh" typeface="Microsoft Uighur"/>
+        <a:font script="Geor" typeface="Sylfaen"/>
+        <a:font script="Armn" typeface="Arial"/>
+        <a:font script="Bugi" typeface="Leelawadee UI"/>
+        <a:font script="Bopo" typeface="Microsoft JhengHei"/>
+        <a:font script="Java" typeface="Javanese Text"/>
+        <a:font script="Lisu" typeface="Segoe UI"/>
+        <a:font script="Mymr" typeface="Myanmar Text"/>
+        <a:font script="Nkoo" typeface="Ebrima"/>
+        <a:font script="Olck" typeface="Nirmala UI"/>
+        <a:font script="Osma" typeface="Ebrima"/>
+        <a:font script="Phag" typeface="Phagspa"/>
+        <a:font script="Syrn" typeface="Estrangelo Edessa"/>
+        <a:font script="Syrj" typeface="Estrangelo Edessa"/>
+        <a:font script="Syre" typeface="Estrangelo Edessa"/>
+        <a:font script="Sora" typeface="Nirmala UI"/>
+        <a:font script="Tale" typeface="Microsoft Tai Le"/>
+        <a:font script="Talu" typeface="Microsoft New Tai Lue"/>
+        <a:font script="Tfng" typeface="Ebrima"/>
+      </a:minorFont>
+    </a:fontScheme>
+    <a:fmtScheme name="Office">
+      <a:fillStyleLst>
+        <a:solidFill>
+          <a:schemeClr val="phClr"/>
+        </a:solidFill>
+        <a:gradFill rotWithShape="1">
+          <a:gsLst>
+            <a:gs pos="0">
+              <a:schemeClr val="phClr">
+                <a:lumMod val="110000"/>
+                <a:satMod val="105000"/>
+                <a:tint val="67000"/>
+              </a:schemeClr>
+            </a:gs>
+            <a:gs pos="50000">
+              <a:schemeClr val="phClr">
+                <a:lumMod val="105000"/>
+                <a:satMod val="103000"/>
+                <a:tint val="73000"/>
+              </a:schemeClr>
+            </a:gs>
+            <a:gs pos="100000">
+              <a:schemeClr val="phClr">
+                <a:lumMod val="105000"/>
+                <a:satMod val="109000"/>
+                <a:tint val="81000"/>
+              </a:schemeClr>
+            </a:gs>
+          </a:gsLst>
+          <a:lin ang="5400000" scaled="0"/>
+        </a:gradFill>
+        <a:gradFill rotWithShape="1">
+          <a:gsLst>
+            <a:gs pos="0">
+              <a:schemeClr val="phClr">
+                <a:satMod val="103000"/>
+                <a:lumMod val="102000"/>
+                <a:tint val="94000"/>
+              </a:schemeClr>
+            </a:gs>
+            <a:gs pos="50000">
+              <a:schemeClr val="phClr">
+                <a:satMod val="110000"/>
+                <a:lumMod val="100000"/>
+                <a:shade val="100000"/>
+              </a:schemeClr>
+            </a:gs>
+            <a:gs pos="100000">
+              <a:schemeClr val="phClr">
+                <a:lumMod val="99000"/>
+                <a:satMod val="120000"/>
+                <a:shade val="78000"/>
+              </a:schemeClr>
+            </a:gs>
+          </a:gsLst>
+          <a:lin ang="5400000" scaled="0"/>
+        </a:gradFill>
+      </a:fillStyleLst>
+      <a:lnStyleLst>
+        <a:ln w="6350" cap="flat" cmpd="sng" algn="ctr">
+          <a:solidFill>
+            <a:schemeClr val="phClr"/>
+          </a:solidFill>
+          <a:prstDash val="solid"/>
+          <a:miter lim="800000"/>
+        </a:ln>
+        <a:ln w="12700" cap="flat" cmpd="sng" algn="ctr">
+          <a:solidFill>
+            <a:schemeClr val="phClr"/>
+          </a:solidFill>
+          <a:prstDash val="solid"/>
+          <a:miter lim="800000"/>
+        </a:ln>
+        <a:ln w="19050" cap="flat" cmpd="sng" algn="ctr">
+          <a:solidFill>
+            <a:schemeClr val="phClr"/>
+          </a:solidFill>
+          <a:prstDash val="solid"/>
+          <a:miter lim="800000"/>
+        </a:ln>
+      </a:lnStyleLst>
+      <a:effectStyleLst>
+        <a:effectStyle>
+          <a:effectLst/>
+        </a:effectStyle>
+        <a:effectStyle>
+          <a:effectLst/>
+        </a:effectStyle>
+        <a:effectStyle>
+          <a:effectLst>
+            <a:outerShdw blurRad="57150" dist="19050" dir="5400000" algn="ctr" rotWithShape="0">
+              <a:srgbClr val="000000">
+                <a:alpha val="63000"/>
+              </a:srgbClr>
+            </a:outerShdw>
+          </a:effectLst>
+        </a:effectStyle>
+      </a:effectStyleLst>
+      <a:bgFillStyleLst>
+        <a:solidFill>
+          <a:schemeClr val="phClr"/>
+        </a:solidFill>
+        <a:solidFill>
+          <a:schemeClr val="phClr">
+            <a:tint val="95000"/>
+            <a:satMod val="170000"/>
+          </a:schemeClr>
+        </a:solidFill>
+        <a:gradFill rotWithShape="1">
+          <a:gsLst>
+            <a:gs pos="0">
+              <a:schemeClr val="phClr">
+                <a:tint val="93000"/>
+                <a:satMod val="150000"/>
+                <a:shade val="98000"/>
+                <a:lumMod val="102000"/>
+              </a:schemeClr>
+            </a:gs>
+            <a:gs pos="50000">
+              <a:schemeClr val="phClr">
+                <a:tint val="98000"/>
+                <a:satMod val="130000"/>
+                <a:shade val="90000"/>
+                <a:lumMod val="103000"/>
+              </a:schemeClr>
+            </a:gs>
+            <a:gs pos="100000">
+              <a:schemeClr val="phClr">
+                <a:shade val="63000"/>
+                <a:satMod val="120000"/>
+              </a:schemeClr>
+            </a:gs>
+          </a:gsLst>
+          <a:lin ang="5400000" scaled="0"/>
+        </a:gradFill>
+      </a:bgFillStyleLst>
+    </a:fmtScheme>
+  </a:themeElements>
+  <a:objectDefaults/>
+  <a:extraClrSchemeLst/>
+  <a:extLst>
+    <a:ext uri="{05A4C25C-085E-4340-85A3-A5531E510DB2}">
+      <thm15:themeFamily xmlns:thm15="http://schemas.microsoft.com/office/thememl/2012/main" name="Office Theme" id="{62F939B6-93AF-4DB8-9C6B-D6C7DFDC589F}" vid="{4A3C46E8-61CC-4603-A589-7422A47A8E4A}"/>
+    </a:ext>
+  </a:extLst>
+</a:theme>
 </file>
</xml_diff>

<commit_message>
update to bridge, started command
</commit_message>
<xml_diff>
--- a/Design Patterns/Bridge Design Pattern.pptx
+++ b/Design Patterns/Bridge Design Pattern.pptx
@@ -202,7 +202,7 @@
           <a:p>
             <a:fld id="{D9223263-2300-4AC1-BB7E-FFDBA5CF77B2}" type="datetimeFigureOut">
               <a:rPr lang="en-US" smtClean="0"/>
-              <a:t>4/26/2019</a:t>
+              <a:t>4/30/2019</a:t>
             </a:fld>
             <a:endParaRPr lang="en-US"/>
           </a:p>
@@ -1088,7 +1088,7 @@
           <a:noFill/>
           <a:extLst>
             <a:ext uri="{909E8E84-426E-40dd-AFC4-6F175D3DCCD1}">
-              <a14:hiddenFill xmlns:a14="http://schemas.microsoft.com/office/drawing/2010/main" xmlns="">
+              <a14:hiddenFill xmlns="" xmlns:a14="http://schemas.microsoft.com/office/drawing/2010/main">
                 <a:solidFill>
                   <a:srgbClr val="FFFFFF"/>
                 </a:solidFill>
@@ -1147,7 +1147,7 @@
             </a:ln>
             <a:extLst>
               <a:ext uri="{91240B29-F687-4f45-9708-019B960494DF}">
-                <a14:hiddenLine xmlns:a14="http://schemas.microsoft.com/office/drawing/2010/main" xmlns="" w="9525">
+                <a14:hiddenLine xmlns="" xmlns:a14="http://schemas.microsoft.com/office/drawing/2010/main" w="9525">
                   <a:solidFill>
                     <a:srgbClr val="000000"/>
                   </a:solidFill>
@@ -1237,7 +1237,7 @@
             </a:ln>
             <a:extLst>
               <a:ext uri="{91240B29-F687-4f45-9708-019B960494DF}">
-                <a14:hiddenLine xmlns:a14="http://schemas.microsoft.com/office/drawing/2010/main" xmlns="" w="9525">
+                <a14:hiddenLine xmlns="" xmlns:a14="http://schemas.microsoft.com/office/drawing/2010/main" w="9525">
                   <a:solidFill>
                     <a:srgbClr val="000000"/>
                   </a:solidFill>
@@ -1327,7 +1327,7 @@
             </a:ln>
             <a:extLst>
               <a:ext uri="{91240B29-F687-4f45-9708-019B960494DF}">
-                <a14:hiddenLine xmlns:a14="http://schemas.microsoft.com/office/drawing/2010/main" xmlns="" w="9525">
+                <a14:hiddenLine xmlns="" xmlns:a14="http://schemas.microsoft.com/office/drawing/2010/main" w="9525">
                   <a:solidFill>
                     <a:srgbClr val="000000"/>
                   </a:solidFill>
@@ -1361,7 +1361,7 @@
             </a:ln>
             <a:extLst>
               <a:ext uri="{91240B29-F687-4f45-9708-019B960494DF}">
-                <a14:hiddenLine xmlns:a14="http://schemas.microsoft.com/office/drawing/2010/main" xmlns="" w="9525">
+                <a14:hiddenLine xmlns="" xmlns:a14="http://schemas.microsoft.com/office/drawing/2010/main" w="9525">
                   <a:solidFill>
                     <a:srgbClr val="000000"/>
                   </a:solidFill>
@@ -1451,7 +1451,7 @@
             </a:ln>
             <a:extLst>
               <a:ext uri="{91240B29-F687-4f45-9708-019B960494DF}">
-                <a14:hiddenLine xmlns:a14="http://schemas.microsoft.com/office/drawing/2010/main" xmlns="" w="9525">
+                <a14:hiddenLine xmlns="" xmlns:a14="http://schemas.microsoft.com/office/drawing/2010/main" w="9525">
                   <a:solidFill>
                     <a:srgbClr val="000000"/>
                   </a:solidFill>
@@ -1513,7 +1513,7 @@
             </a:ln>
             <a:extLst>
               <a:ext uri="{91240B29-F687-4f45-9708-019B960494DF}">
-                <a14:hiddenLine xmlns:a14="http://schemas.microsoft.com/office/drawing/2010/main" xmlns="" w="9525">
+                <a14:hiddenLine xmlns="" xmlns:a14="http://schemas.microsoft.com/office/drawing/2010/main" w="9525">
                   <a:solidFill>
                     <a:srgbClr val="000000"/>
                   </a:solidFill>
@@ -1575,7 +1575,7 @@
             </a:ln>
             <a:extLst>
               <a:ext uri="{91240B29-F687-4f45-9708-019B960494DF}">
-                <a14:hiddenLine xmlns:a14="http://schemas.microsoft.com/office/drawing/2010/main" xmlns="" w="9525">
+                <a14:hiddenLine xmlns="" xmlns:a14="http://schemas.microsoft.com/office/drawing/2010/main" w="9525">
                   <a:solidFill>
                     <a:srgbClr val="000000"/>
                   </a:solidFill>
@@ -1665,7 +1665,7 @@
             </a:ln>
             <a:extLst>
               <a:ext uri="{91240B29-F687-4f45-9708-019B960494DF}">
-                <a14:hiddenLine xmlns:a14="http://schemas.microsoft.com/office/drawing/2010/main" xmlns="" w="9525">
+                <a14:hiddenLine xmlns="" xmlns:a14="http://schemas.microsoft.com/office/drawing/2010/main" w="9525">
                   <a:solidFill>
                     <a:srgbClr val="000000"/>
                   </a:solidFill>
@@ -1727,7 +1727,7 @@
             </a:ln>
             <a:extLst>
               <a:ext uri="{91240B29-F687-4f45-9708-019B960494DF}">
-                <a14:hiddenLine xmlns:a14="http://schemas.microsoft.com/office/drawing/2010/main" xmlns="" w="9525">
+                <a14:hiddenLine xmlns="" xmlns:a14="http://schemas.microsoft.com/office/drawing/2010/main" w="9525">
                   <a:solidFill>
                     <a:srgbClr val="000000"/>
                   </a:solidFill>
@@ -1789,7 +1789,7 @@
             </a:ln>
             <a:extLst>
               <a:ext uri="{91240B29-F687-4f45-9708-019B960494DF}">
-                <a14:hiddenLine xmlns:a14="http://schemas.microsoft.com/office/drawing/2010/main" xmlns="" w="9525">
+                <a14:hiddenLine xmlns="" xmlns:a14="http://schemas.microsoft.com/office/drawing/2010/main" w="9525">
                   <a:solidFill>
                     <a:srgbClr val="000000"/>
                   </a:solidFill>
@@ -1879,7 +1879,7 @@
             </a:ln>
             <a:extLst>
               <a:ext uri="{91240B29-F687-4f45-9708-019B960494DF}">
-                <a14:hiddenLine xmlns:a14="http://schemas.microsoft.com/office/drawing/2010/main" xmlns="" w="9525">
+                <a14:hiddenLine xmlns="" xmlns:a14="http://schemas.microsoft.com/office/drawing/2010/main" w="9525">
                   <a:solidFill>
                     <a:srgbClr val="000000"/>
                   </a:solidFill>
@@ -1969,7 +1969,7 @@
             </a:ln>
             <a:extLst>
               <a:ext uri="{91240B29-F687-4f45-9708-019B960494DF}">
-                <a14:hiddenLine xmlns:a14="http://schemas.microsoft.com/office/drawing/2010/main" xmlns="" w="9525">
+                <a14:hiddenLine xmlns="" xmlns:a14="http://schemas.microsoft.com/office/drawing/2010/main" w="9525">
                   <a:solidFill>
                     <a:srgbClr val="000000"/>
                   </a:solidFill>
@@ -2031,7 +2031,7 @@
             </a:ln>
             <a:extLst>
               <a:ext uri="{91240B29-F687-4f45-9708-019B960494DF}">
-                <a14:hiddenLine xmlns:a14="http://schemas.microsoft.com/office/drawing/2010/main" xmlns="" w="9525">
+                <a14:hiddenLine xmlns="" xmlns:a14="http://schemas.microsoft.com/office/drawing/2010/main" w="9525">
                   <a:solidFill>
                     <a:srgbClr val="000000"/>
                   </a:solidFill>
@@ -2141,7 +2141,7 @@
             </a:ln>
             <a:extLst>
               <a:ext uri="{91240B29-F687-4f45-9708-019B960494DF}">
-                <a14:hiddenLine xmlns:a14="http://schemas.microsoft.com/office/drawing/2010/main" xmlns="" w="9525">
+                <a14:hiddenLine xmlns="" xmlns:a14="http://schemas.microsoft.com/office/drawing/2010/main" w="9525">
                   <a:solidFill>
                     <a:srgbClr val="000000"/>
                   </a:solidFill>
@@ -2203,7 +2203,7 @@
             </a:ln>
             <a:extLst>
               <a:ext uri="{91240B29-F687-4f45-9708-019B960494DF}">
-                <a14:hiddenLine xmlns:a14="http://schemas.microsoft.com/office/drawing/2010/main" xmlns="" w="9525">
+                <a14:hiddenLine xmlns="" xmlns:a14="http://schemas.microsoft.com/office/drawing/2010/main" w="9525">
                   <a:solidFill>
                     <a:srgbClr val="000000"/>
                   </a:solidFill>
@@ -2293,7 +2293,7 @@
             </a:ln>
             <a:extLst>
               <a:ext uri="{91240B29-F687-4f45-9708-019B960494DF}">
-                <a14:hiddenLine xmlns:a14="http://schemas.microsoft.com/office/drawing/2010/main" xmlns="" w="9525">
+                <a14:hiddenLine xmlns="" xmlns:a14="http://schemas.microsoft.com/office/drawing/2010/main" w="9525">
                   <a:solidFill>
                     <a:srgbClr val="000000"/>
                   </a:solidFill>
@@ -2383,7 +2383,7 @@
             </a:ln>
             <a:extLst>
               <a:ext uri="{91240B29-F687-4f45-9708-019B960494DF}">
-                <a14:hiddenLine xmlns:a14="http://schemas.microsoft.com/office/drawing/2010/main" xmlns="" w="9525">
+                <a14:hiddenLine xmlns="" xmlns:a14="http://schemas.microsoft.com/office/drawing/2010/main" w="9525">
                   <a:solidFill>
                     <a:srgbClr val="000000"/>
                   </a:solidFill>
@@ -2445,7 +2445,7 @@
             </a:ln>
             <a:extLst>
               <a:ext uri="{91240B29-F687-4f45-9708-019B960494DF}">
-                <a14:hiddenLine xmlns:a14="http://schemas.microsoft.com/office/drawing/2010/main" xmlns="" w="9525">
+                <a14:hiddenLine xmlns="" xmlns:a14="http://schemas.microsoft.com/office/drawing/2010/main" w="9525">
                   <a:solidFill>
                     <a:srgbClr val="000000"/>
                   </a:solidFill>
@@ -2535,7 +2535,7 @@
             </a:ln>
             <a:extLst>
               <a:ext uri="{91240B29-F687-4f45-9708-019B960494DF}">
-                <a14:hiddenLine xmlns:a14="http://schemas.microsoft.com/office/drawing/2010/main" xmlns="" w="9525">
+                <a14:hiddenLine xmlns="" xmlns:a14="http://schemas.microsoft.com/office/drawing/2010/main" w="9525">
                   <a:solidFill>
                     <a:srgbClr val="000000"/>
                   </a:solidFill>
@@ -2625,7 +2625,7 @@
             </a:ln>
             <a:extLst>
               <a:ext uri="{91240B29-F687-4f45-9708-019B960494DF}">
-                <a14:hiddenLine xmlns:a14="http://schemas.microsoft.com/office/drawing/2010/main" xmlns="" w="9525">
+                <a14:hiddenLine xmlns="" xmlns:a14="http://schemas.microsoft.com/office/drawing/2010/main" w="9525">
                   <a:solidFill>
                     <a:srgbClr val="000000"/>
                   </a:solidFill>
@@ -2681,7 +2681,7 @@
             </a:ln>
             <a:extLst>
               <a:ext uri="{91240B29-F687-4f45-9708-019B960494DF}">
-                <a14:hiddenLine xmlns:a14="http://schemas.microsoft.com/office/drawing/2010/main" xmlns="" w="9525">
+                <a14:hiddenLine xmlns="" xmlns:a14="http://schemas.microsoft.com/office/drawing/2010/main" w="9525">
                   <a:solidFill>
                     <a:srgbClr val="000000"/>
                   </a:solidFill>
@@ -2771,7 +2771,7 @@
             </a:ln>
             <a:extLst>
               <a:ext uri="{91240B29-F687-4f45-9708-019B960494DF}">
-                <a14:hiddenLine xmlns:a14="http://schemas.microsoft.com/office/drawing/2010/main" xmlns="" w="9525">
+                <a14:hiddenLine xmlns="" xmlns:a14="http://schemas.microsoft.com/office/drawing/2010/main" w="9525">
                   <a:solidFill>
                     <a:srgbClr val="000000"/>
                   </a:solidFill>
@@ -2827,7 +2827,7 @@
             </a:ln>
             <a:extLst>
               <a:ext uri="{91240B29-F687-4f45-9708-019B960494DF}">
-                <a14:hiddenLine xmlns:a14="http://schemas.microsoft.com/office/drawing/2010/main" xmlns="" w="9525">
+                <a14:hiddenLine xmlns="" xmlns:a14="http://schemas.microsoft.com/office/drawing/2010/main" w="9525">
                   <a:solidFill>
                     <a:srgbClr val="000000"/>
                   </a:solidFill>
@@ -2917,7 +2917,7 @@
             </a:ln>
             <a:extLst>
               <a:ext uri="{91240B29-F687-4f45-9708-019B960494DF}">
-                <a14:hiddenLine xmlns:a14="http://schemas.microsoft.com/office/drawing/2010/main" xmlns="" w="9525">
+                <a14:hiddenLine xmlns="" xmlns:a14="http://schemas.microsoft.com/office/drawing/2010/main" w="9525">
                   <a:solidFill>
                     <a:srgbClr val="000000"/>
                   </a:solidFill>
@@ -2985,7 +2985,7 @@
             </a:ln>
             <a:extLst>
               <a:ext uri="{91240B29-F687-4f45-9708-019B960494DF}">
-                <a14:hiddenLine xmlns:a14="http://schemas.microsoft.com/office/drawing/2010/main" xmlns="" w="9525">
+                <a14:hiddenLine xmlns="" xmlns:a14="http://schemas.microsoft.com/office/drawing/2010/main" w="9525">
                   <a:solidFill>
                     <a:srgbClr val="000000"/>
                   </a:solidFill>
@@ -3075,7 +3075,7 @@
             </a:ln>
             <a:extLst>
               <a:ext uri="{91240B29-F687-4f45-9708-019B960494DF}">
-                <a14:hiddenLine xmlns:a14="http://schemas.microsoft.com/office/drawing/2010/main" xmlns="" w="9525">
+                <a14:hiddenLine xmlns="" xmlns:a14="http://schemas.microsoft.com/office/drawing/2010/main" w="9525">
                   <a:solidFill>
                     <a:srgbClr val="000000"/>
                   </a:solidFill>
@@ -3143,7 +3143,7 @@
             </a:ln>
             <a:extLst>
               <a:ext uri="{91240B29-F687-4f45-9708-019B960494DF}">
-                <a14:hiddenLine xmlns:a14="http://schemas.microsoft.com/office/drawing/2010/main" xmlns="" w="9525">
+                <a14:hiddenLine xmlns="" xmlns:a14="http://schemas.microsoft.com/office/drawing/2010/main" w="9525">
                   <a:solidFill>
                     <a:srgbClr val="000000"/>
                   </a:solidFill>
@@ -3233,7 +3233,7 @@
             </a:ln>
             <a:extLst>
               <a:ext uri="{91240B29-F687-4f45-9708-019B960494DF}">
-                <a14:hiddenLine xmlns:a14="http://schemas.microsoft.com/office/drawing/2010/main" xmlns="" w="9525">
+                <a14:hiddenLine xmlns="" xmlns:a14="http://schemas.microsoft.com/office/drawing/2010/main" w="9525">
                   <a:solidFill>
                     <a:srgbClr val="000000"/>
                   </a:solidFill>
@@ -3267,7 +3267,7 @@
             </a:ln>
             <a:extLst>
               <a:ext uri="{91240B29-F687-4f45-9708-019B960494DF}">
-                <a14:hiddenLine xmlns:a14="http://schemas.microsoft.com/office/drawing/2010/main" xmlns="" w="9525">
+                <a14:hiddenLine xmlns="" xmlns:a14="http://schemas.microsoft.com/office/drawing/2010/main" w="9525">
                   <a:solidFill>
                     <a:srgbClr val="000000"/>
                   </a:solidFill>
@@ -3357,7 +3357,7 @@
             </a:ln>
             <a:extLst>
               <a:ext uri="{91240B29-F687-4f45-9708-019B960494DF}">
-                <a14:hiddenLine xmlns:a14="http://schemas.microsoft.com/office/drawing/2010/main" xmlns="" w="9525">
+                <a14:hiddenLine xmlns="" xmlns:a14="http://schemas.microsoft.com/office/drawing/2010/main" w="9525">
                   <a:solidFill>
                     <a:srgbClr val="000000"/>
                   </a:solidFill>
@@ -3419,7 +3419,7 @@
             </a:ln>
             <a:extLst>
               <a:ext uri="{91240B29-F687-4f45-9708-019B960494DF}">
-                <a14:hiddenLine xmlns:a14="http://schemas.microsoft.com/office/drawing/2010/main" xmlns="" w="9525">
+                <a14:hiddenLine xmlns="" xmlns:a14="http://schemas.microsoft.com/office/drawing/2010/main" w="9525">
                   <a:solidFill>
                     <a:srgbClr val="000000"/>
                   </a:solidFill>
@@ -3481,7 +3481,7 @@
             </a:ln>
             <a:extLst>
               <a:ext uri="{91240B29-F687-4f45-9708-019B960494DF}">
-                <a14:hiddenLine xmlns:a14="http://schemas.microsoft.com/office/drawing/2010/main" xmlns="" w="9525">
+                <a14:hiddenLine xmlns="" xmlns:a14="http://schemas.microsoft.com/office/drawing/2010/main" w="9525">
                   <a:solidFill>
                     <a:srgbClr val="000000"/>
                   </a:solidFill>
@@ -3571,7 +3571,7 @@
             </a:ln>
             <a:extLst>
               <a:ext uri="{91240B29-F687-4f45-9708-019B960494DF}">
-                <a14:hiddenLine xmlns:a14="http://schemas.microsoft.com/office/drawing/2010/main" xmlns="" w="9525">
+                <a14:hiddenLine xmlns="" xmlns:a14="http://schemas.microsoft.com/office/drawing/2010/main" w="9525">
                   <a:solidFill>
                     <a:srgbClr val="000000"/>
                   </a:solidFill>
@@ -3639,7 +3639,7 @@
             </a:ln>
             <a:extLst>
               <a:ext uri="{91240B29-F687-4f45-9708-019B960494DF}">
-                <a14:hiddenLine xmlns:a14="http://schemas.microsoft.com/office/drawing/2010/main" xmlns="" w="9525">
+                <a14:hiddenLine xmlns="" xmlns:a14="http://schemas.microsoft.com/office/drawing/2010/main" w="9525">
                   <a:solidFill>
                     <a:srgbClr val="000000"/>
                   </a:solidFill>
@@ -3701,7 +3701,7 @@
             </a:ln>
             <a:extLst>
               <a:ext uri="{91240B29-F687-4f45-9708-019B960494DF}">
-                <a14:hiddenLine xmlns:a14="http://schemas.microsoft.com/office/drawing/2010/main" xmlns="" w="9525">
+                <a14:hiddenLine xmlns="" xmlns:a14="http://schemas.microsoft.com/office/drawing/2010/main" w="9525">
                   <a:solidFill>
                     <a:srgbClr val="000000"/>
                   </a:solidFill>
@@ -3791,7 +3791,7 @@
             </a:ln>
             <a:extLst>
               <a:ext uri="{91240B29-F687-4f45-9708-019B960494DF}">
-                <a14:hiddenLine xmlns:a14="http://schemas.microsoft.com/office/drawing/2010/main" xmlns="" w="9525">
+                <a14:hiddenLine xmlns="" xmlns:a14="http://schemas.microsoft.com/office/drawing/2010/main" w="9525">
                   <a:solidFill>
                     <a:srgbClr val="000000"/>
                   </a:solidFill>
@@ -3853,7 +3853,7 @@
             </a:ln>
             <a:extLst>
               <a:ext uri="{91240B29-F687-4f45-9708-019B960494DF}">
-                <a14:hiddenLine xmlns:a14="http://schemas.microsoft.com/office/drawing/2010/main" xmlns="" w="9525">
+                <a14:hiddenLine xmlns="" xmlns:a14="http://schemas.microsoft.com/office/drawing/2010/main" w="9525">
                   <a:solidFill>
                     <a:srgbClr val="000000"/>
                   </a:solidFill>
@@ -3943,7 +3943,7 @@
             </a:ln>
             <a:extLst>
               <a:ext uri="{91240B29-F687-4f45-9708-019B960494DF}">
-                <a14:hiddenLine xmlns:a14="http://schemas.microsoft.com/office/drawing/2010/main" xmlns="" w="9525">
+                <a14:hiddenLine xmlns="" xmlns:a14="http://schemas.microsoft.com/office/drawing/2010/main" w="9525">
                   <a:solidFill>
                     <a:srgbClr val="000000"/>
                   </a:solidFill>
@@ -4005,7 +4005,7 @@
             </a:ln>
             <a:extLst>
               <a:ext uri="{91240B29-F687-4f45-9708-019B960494DF}">
-                <a14:hiddenLine xmlns:a14="http://schemas.microsoft.com/office/drawing/2010/main" xmlns="" w="9525">
+                <a14:hiddenLine xmlns="" xmlns:a14="http://schemas.microsoft.com/office/drawing/2010/main" w="9525">
                   <a:solidFill>
                     <a:srgbClr val="000000"/>
                   </a:solidFill>
@@ -4095,7 +4095,7 @@
             </a:ln>
             <a:extLst>
               <a:ext uri="{91240B29-F687-4f45-9708-019B960494DF}">
-                <a14:hiddenLine xmlns:a14="http://schemas.microsoft.com/office/drawing/2010/main" xmlns="" w="9525">
+                <a14:hiddenLine xmlns="" xmlns:a14="http://schemas.microsoft.com/office/drawing/2010/main" w="9525">
                   <a:solidFill>
                     <a:srgbClr val="000000"/>
                   </a:solidFill>
@@ -4129,7 +4129,7 @@
             </a:ln>
             <a:extLst>
               <a:ext uri="{91240B29-F687-4f45-9708-019B960494DF}">
-                <a14:hiddenLine xmlns:a14="http://schemas.microsoft.com/office/drawing/2010/main" xmlns="" w="9525">
+                <a14:hiddenLine xmlns="" xmlns:a14="http://schemas.microsoft.com/office/drawing/2010/main" w="9525">
                   <a:solidFill>
                     <a:srgbClr val="000000"/>
                   </a:solidFill>
@@ -4194,7 +4194,7 @@
             </a:ln>
             <a:extLst>
               <a:ext uri="{91240B29-F687-4f45-9708-019B960494DF}">
-                <a14:hiddenLine xmlns:a14="http://schemas.microsoft.com/office/drawing/2010/main" xmlns="" w="9525">
+                <a14:hiddenLine xmlns="" xmlns:a14="http://schemas.microsoft.com/office/drawing/2010/main" w="9525">
                   <a:solidFill>
                     <a:srgbClr val="000000"/>
                   </a:solidFill>
@@ -4284,7 +4284,7 @@
             </a:ln>
             <a:extLst>
               <a:ext uri="{91240B29-F687-4f45-9708-019B960494DF}">
-                <a14:hiddenLine xmlns:a14="http://schemas.microsoft.com/office/drawing/2010/main" xmlns="" w="9525">
+                <a14:hiddenLine xmlns="" xmlns:a14="http://schemas.microsoft.com/office/drawing/2010/main" w="9525">
                   <a:solidFill>
                     <a:srgbClr val="000000"/>
                   </a:solidFill>
@@ -4346,7 +4346,7 @@
             </a:ln>
             <a:extLst>
               <a:ext uri="{91240B29-F687-4f45-9708-019B960494DF}">
-                <a14:hiddenLine xmlns:a14="http://schemas.microsoft.com/office/drawing/2010/main" xmlns="" w="9525">
+                <a14:hiddenLine xmlns="" xmlns:a14="http://schemas.microsoft.com/office/drawing/2010/main" w="9525">
                   <a:solidFill>
                     <a:srgbClr val="000000"/>
                   </a:solidFill>
@@ -4436,7 +4436,7 @@
             </a:ln>
             <a:extLst>
               <a:ext uri="{91240B29-F687-4f45-9708-019B960494DF}">
-                <a14:hiddenLine xmlns:a14="http://schemas.microsoft.com/office/drawing/2010/main" xmlns="" w="9525">
+                <a14:hiddenLine xmlns="" xmlns:a14="http://schemas.microsoft.com/office/drawing/2010/main" w="9525">
                   <a:solidFill>
                     <a:srgbClr val="000000"/>
                   </a:solidFill>
@@ -4526,7 +4526,7 @@
             </a:ln>
             <a:extLst>
               <a:ext uri="{91240B29-F687-4f45-9708-019B960494DF}">
-                <a14:hiddenLine xmlns:a14="http://schemas.microsoft.com/office/drawing/2010/main" xmlns="" w="9525">
+                <a14:hiddenLine xmlns="" xmlns:a14="http://schemas.microsoft.com/office/drawing/2010/main" w="9525">
                   <a:solidFill>
                     <a:srgbClr val="000000"/>
                   </a:solidFill>
@@ -4591,7 +4591,7 @@
             </a:ln>
             <a:extLst>
               <a:ext uri="{91240B29-F687-4f45-9708-019B960494DF}">
-                <a14:hiddenLine xmlns:a14="http://schemas.microsoft.com/office/drawing/2010/main" xmlns="" w="9525">
+                <a14:hiddenLine xmlns="" xmlns:a14="http://schemas.microsoft.com/office/drawing/2010/main" w="9525">
                   <a:solidFill>
                     <a:srgbClr val="000000"/>
                   </a:solidFill>
@@ -4653,7 +4653,7 @@
             </a:ln>
             <a:extLst>
               <a:ext uri="{91240B29-F687-4f45-9708-019B960494DF}">
-                <a14:hiddenLine xmlns:a14="http://schemas.microsoft.com/office/drawing/2010/main" xmlns="" w="9525">
+                <a14:hiddenLine xmlns="" xmlns:a14="http://schemas.microsoft.com/office/drawing/2010/main" w="9525">
                   <a:solidFill>
                     <a:srgbClr val="000000"/>
                   </a:solidFill>
@@ -4743,7 +4743,7 @@
             </a:ln>
             <a:extLst>
               <a:ext uri="{91240B29-F687-4f45-9708-019B960494DF}">
-                <a14:hiddenLine xmlns:a14="http://schemas.microsoft.com/office/drawing/2010/main" xmlns="" w="9525">
+                <a14:hiddenLine xmlns="" xmlns:a14="http://schemas.microsoft.com/office/drawing/2010/main" w="9525">
                   <a:solidFill>
                     <a:srgbClr val="000000"/>
                   </a:solidFill>
@@ -4833,7 +4833,7 @@
             </a:ln>
             <a:extLst>
               <a:ext uri="{91240B29-F687-4f45-9708-019B960494DF}">
-                <a14:hiddenLine xmlns:a14="http://schemas.microsoft.com/office/drawing/2010/main" xmlns="" w="9525">
+                <a14:hiddenLine xmlns="" xmlns:a14="http://schemas.microsoft.com/office/drawing/2010/main" w="9525">
                   <a:solidFill>
                     <a:srgbClr val="000000"/>
                   </a:solidFill>
@@ -4895,7 +4895,7 @@
             </a:ln>
             <a:extLst>
               <a:ext uri="{91240B29-F687-4f45-9708-019B960494DF}">
-                <a14:hiddenLine xmlns:a14="http://schemas.microsoft.com/office/drawing/2010/main" xmlns="" w="9525">
+                <a14:hiddenLine xmlns="" xmlns:a14="http://schemas.microsoft.com/office/drawing/2010/main" w="9525">
                   <a:solidFill>
                     <a:srgbClr val="000000"/>
                   </a:solidFill>
@@ -5015,7 +5015,7 @@
             </a:ln>
             <a:extLst>
               <a:ext uri="{91240B29-F687-4f45-9708-019B960494DF}">
-                <a14:hiddenLine xmlns:a14="http://schemas.microsoft.com/office/drawing/2010/main" xmlns="" w="9525">
+                <a14:hiddenLine xmlns="" xmlns:a14="http://schemas.microsoft.com/office/drawing/2010/main" w="9525">
                   <a:solidFill>
                     <a:srgbClr val="000000"/>
                   </a:solidFill>
@@ -5083,7 +5083,7 @@
             </a:ln>
             <a:extLst>
               <a:ext uri="{91240B29-F687-4f45-9708-019B960494DF}">
-                <a14:hiddenLine xmlns:a14="http://schemas.microsoft.com/office/drawing/2010/main" xmlns="" w="9525">
+                <a14:hiddenLine xmlns="" xmlns:a14="http://schemas.microsoft.com/office/drawing/2010/main" w="9525">
                   <a:solidFill>
                     <a:srgbClr val="000000"/>
                   </a:solidFill>
@@ -5173,7 +5173,7 @@
             </a:ln>
             <a:extLst>
               <a:ext uri="{91240B29-F687-4f45-9708-019B960494DF}">
-                <a14:hiddenLine xmlns:a14="http://schemas.microsoft.com/office/drawing/2010/main" xmlns="" w="9525">
+                <a14:hiddenLine xmlns="" xmlns:a14="http://schemas.microsoft.com/office/drawing/2010/main" w="9525">
                   <a:solidFill>
                     <a:srgbClr val="000000"/>
                   </a:solidFill>
@@ -5313,7 +5313,7 @@
           <a:p>
             <a:fld id="{48A87A34-81AB-432B-8DAE-1953F412C126}" type="datetimeFigureOut">
               <a:rPr lang="en-US" dirty="0"/>
-              <a:t>4/26/2019</a:t>
+              <a:t>4/30/2019</a:t>
             </a:fld>
             <a:endParaRPr lang="en-US" dirty="0"/>
           </a:p>
@@ -5575,7 +5575,7 @@
           <a:p>
             <a:fld id="{48A87A34-81AB-432B-8DAE-1953F412C126}" type="datetimeFigureOut">
               <a:rPr lang="en-US" dirty="0"/>
-              <a:t>4/26/2019</a:t>
+              <a:t>4/30/2019</a:t>
             </a:fld>
             <a:endParaRPr lang="en-US" dirty="0"/>
           </a:p>
@@ -5766,7 +5766,7 @@
           <a:p>
             <a:fld id="{48A87A34-81AB-432B-8DAE-1953F412C126}" type="datetimeFigureOut">
               <a:rPr lang="en-US" dirty="0"/>
-              <a:t>4/26/2019</a:t>
+              <a:t>4/30/2019</a:t>
             </a:fld>
             <a:endParaRPr lang="en-US" dirty="0"/>
           </a:p>
@@ -6024,7 +6024,7 @@
           <a:p>
             <a:fld id="{48A87A34-81AB-432B-8DAE-1953F412C126}" type="datetimeFigureOut">
               <a:rPr lang="en-US" dirty="0"/>
-              <a:t>4/26/2019</a:t>
+              <a:t>4/30/2019</a:t>
             </a:fld>
             <a:endParaRPr lang="en-US" dirty="0"/>
           </a:p>
@@ -6453,7 +6453,7 @@
           <a:p>
             <a:fld id="{48A87A34-81AB-432B-8DAE-1953F412C126}" type="datetimeFigureOut">
               <a:rPr lang="en-US" dirty="0"/>
-              <a:t>4/26/2019</a:t>
+              <a:t>4/30/2019</a:t>
             </a:fld>
             <a:endParaRPr lang="en-US" dirty="0"/>
           </a:p>
@@ -6994,7 +6994,7 @@
           <a:p>
             <a:fld id="{48A87A34-81AB-432B-8DAE-1953F412C126}" type="datetimeFigureOut">
               <a:rPr lang="en-US" dirty="0"/>
-              <a:t>4/26/2019</a:t>
+              <a:t>4/30/2019</a:t>
             </a:fld>
             <a:endParaRPr lang="en-US" dirty="0"/>
           </a:p>
@@ -7709,7 +7709,7 @@
           <a:p>
             <a:fld id="{48A87A34-81AB-432B-8DAE-1953F412C126}" type="datetimeFigureOut">
               <a:rPr lang="en-US" dirty="0"/>
-              <a:t>4/26/2019</a:t>
+              <a:t>4/30/2019</a:t>
             </a:fld>
             <a:endParaRPr lang="en-US" dirty="0"/>
           </a:p>
@@ -7874,7 +7874,7 @@
           <a:p>
             <a:fld id="{48A87A34-81AB-432B-8DAE-1953F412C126}" type="datetimeFigureOut">
               <a:rPr lang="en-US" dirty="0"/>
-              <a:t>4/26/2019</a:t>
+              <a:t>4/30/2019</a:t>
             </a:fld>
             <a:endParaRPr lang="en-US" dirty="0"/>
           </a:p>
@@ -8049,7 +8049,7 @@
           <a:p>
             <a:fld id="{48A87A34-81AB-432B-8DAE-1953F412C126}" type="datetimeFigureOut">
               <a:rPr lang="en-US" dirty="0"/>
-              <a:t>4/26/2019</a:t>
+              <a:t>4/30/2019</a:t>
             </a:fld>
             <a:endParaRPr lang="en-US" dirty="0"/>
           </a:p>
@@ -8214,7 +8214,7 @@
           <a:p>
             <a:fld id="{48A87A34-81AB-432B-8DAE-1953F412C126}" type="datetimeFigureOut">
               <a:rPr lang="en-US" dirty="0"/>
-              <a:t>4/26/2019</a:t>
+              <a:t>4/30/2019</a:t>
             </a:fld>
             <a:endParaRPr lang="en-US" dirty="0"/>
           </a:p>
@@ -8459,7 +8459,7 @@
           <a:p>
             <a:fld id="{48A87A34-81AB-432B-8DAE-1953F412C126}" type="datetimeFigureOut">
               <a:rPr lang="en-US" dirty="0"/>
-              <a:t>4/26/2019</a:t>
+              <a:t>4/30/2019</a:t>
             </a:fld>
             <a:endParaRPr lang="en-US" dirty="0"/>
           </a:p>
@@ -8686,7 +8686,7 @@
           <a:p>
             <a:fld id="{48A87A34-81AB-432B-8DAE-1953F412C126}" type="datetimeFigureOut">
               <a:rPr lang="en-US" dirty="0"/>
-              <a:t>4/26/2019</a:t>
+              <a:t>4/30/2019</a:t>
             </a:fld>
             <a:endParaRPr lang="en-US" dirty="0"/>
           </a:p>
@@ -9062,7 +9062,7 @@
           <a:p>
             <a:fld id="{48A87A34-81AB-432B-8DAE-1953F412C126}" type="datetimeFigureOut">
               <a:rPr lang="en-US" dirty="0"/>
-              <a:t>4/26/2019</a:t>
+              <a:t>4/30/2019</a:t>
             </a:fld>
             <a:endParaRPr lang="en-US" dirty="0"/>
           </a:p>
@@ -9175,7 +9175,7 @@
           <a:p>
             <a:fld id="{48A87A34-81AB-432B-8DAE-1953F412C126}" type="datetimeFigureOut">
               <a:rPr lang="en-US" dirty="0"/>
-              <a:t>4/26/2019</a:t>
+              <a:t>4/30/2019</a:t>
             </a:fld>
             <a:endParaRPr lang="en-US" dirty="0"/>
           </a:p>
@@ -9265,7 +9265,7 @@
           <a:p>
             <a:fld id="{48A87A34-81AB-432B-8DAE-1953F412C126}" type="datetimeFigureOut">
               <a:rPr lang="en-US" dirty="0"/>
-              <a:t>4/26/2019</a:t>
+              <a:t>4/30/2019</a:t>
             </a:fld>
             <a:endParaRPr lang="en-US" dirty="0"/>
           </a:p>
@@ -9509,7 +9509,7 @@
           <a:p>
             <a:fld id="{48A87A34-81AB-432B-8DAE-1953F412C126}" type="datetimeFigureOut">
               <a:rPr lang="en-US" dirty="0"/>
-              <a:t>4/26/2019</a:t>
+              <a:t>4/30/2019</a:t>
             </a:fld>
             <a:endParaRPr lang="en-US" dirty="0"/>
           </a:p>
@@ -9784,7 +9784,7 @@
           <a:p>
             <a:fld id="{48A87A34-81AB-432B-8DAE-1953F412C126}" type="datetimeFigureOut">
               <a:rPr lang="en-US" dirty="0"/>
-              <a:t>4/26/2019</a:t>
+              <a:t>4/30/2019</a:t>
             </a:fld>
             <a:endParaRPr lang="en-US" dirty="0"/>
           </a:p>
@@ -9902,7 +9902,7 @@
           <a:noFill/>
           <a:extLst>
             <a:ext uri="{909E8E84-426E-40dd-AFC4-6F175D3DCCD1}">
-              <a14:hiddenFill xmlns:a14="http://schemas.microsoft.com/office/drawing/2010/main" xmlns="">
+              <a14:hiddenFill xmlns="" xmlns:a14="http://schemas.microsoft.com/office/drawing/2010/main">
                 <a:solidFill>
                   <a:srgbClr val="FFFFFF"/>
                 </a:solidFill>
@@ -9976,7 +9976,7 @@
               </a:ln>
               <a:extLst>
                 <a:ext uri="{91240B29-F687-4f45-9708-019B960494DF}">
-                  <a14:hiddenLine xmlns:a14="http://schemas.microsoft.com/office/drawing/2010/main" xmlns="" w="9525">
+                  <a14:hiddenLine xmlns="" xmlns:a14="http://schemas.microsoft.com/office/drawing/2010/main" w="9525">
                     <a:solidFill>
                       <a:srgbClr val="000000"/>
                     </a:solidFill>
@@ -10066,7 +10066,7 @@
               </a:ln>
               <a:extLst>
                 <a:ext uri="{91240B29-F687-4f45-9708-019B960494DF}">
-                  <a14:hiddenLine xmlns:a14="http://schemas.microsoft.com/office/drawing/2010/main" xmlns="" w="9525">
+                  <a14:hiddenLine xmlns="" xmlns:a14="http://schemas.microsoft.com/office/drawing/2010/main" w="9525">
                     <a:solidFill>
                       <a:srgbClr val="000000"/>
                     </a:solidFill>
@@ -10156,7 +10156,7 @@
               </a:ln>
               <a:extLst>
                 <a:ext uri="{91240B29-F687-4f45-9708-019B960494DF}">
-                  <a14:hiddenLine xmlns:a14="http://schemas.microsoft.com/office/drawing/2010/main" xmlns="" w="9525">
+                  <a14:hiddenLine xmlns="" xmlns:a14="http://schemas.microsoft.com/office/drawing/2010/main" w="9525">
                     <a:solidFill>
                       <a:srgbClr val="000000"/>
                     </a:solidFill>
@@ -10218,7 +10218,7 @@
               </a:ln>
               <a:extLst>
                 <a:ext uri="{91240B29-F687-4f45-9708-019B960494DF}">
-                  <a14:hiddenLine xmlns:a14="http://schemas.microsoft.com/office/drawing/2010/main" xmlns="" w="9525">
+                  <a14:hiddenLine xmlns="" xmlns:a14="http://schemas.microsoft.com/office/drawing/2010/main" w="9525">
                     <a:solidFill>
                       <a:srgbClr val="000000"/>
                     </a:solidFill>
@@ -10308,7 +10308,7 @@
               </a:ln>
               <a:extLst>
                 <a:ext uri="{91240B29-F687-4f45-9708-019B960494DF}">
-                  <a14:hiddenLine xmlns:a14="http://schemas.microsoft.com/office/drawing/2010/main" xmlns="" w="9525">
+                  <a14:hiddenLine xmlns="" xmlns:a14="http://schemas.microsoft.com/office/drawing/2010/main" w="9525">
                     <a:solidFill>
                       <a:srgbClr val="000000"/>
                     </a:solidFill>
@@ -10370,7 +10370,7 @@
               </a:ln>
               <a:extLst>
                 <a:ext uri="{91240B29-F687-4f45-9708-019B960494DF}">
-                  <a14:hiddenLine xmlns:a14="http://schemas.microsoft.com/office/drawing/2010/main" xmlns="" w="9525">
+                  <a14:hiddenLine xmlns="" xmlns:a14="http://schemas.microsoft.com/office/drawing/2010/main" w="9525">
                     <a:solidFill>
                       <a:srgbClr val="000000"/>
                     </a:solidFill>
@@ -10432,7 +10432,7 @@
               </a:ln>
               <a:extLst>
                 <a:ext uri="{91240B29-F687-4f45-9708-019B960494DF}">
-                  <a14:hiddenLine xmlns:a14="http://schemas.microsoft.com/office/drawing/2010/main" xmlns="" w="9525">
+                  <a14:hiddenLine xmlns="" xmlns:a14="http://schemas.microsoft.com/office/drawing/2010/main" w="9525">
                     <a:solidFill>
                       <a:srgbClr val="000000"/>
                     </a:solidFill>
@@ -10522,7 +10522,7 @@
               </a:ln>
               <a:extLst>
                 <a:ext uri="{91240B29-F687-4f45-9708-019B960494DF}">
-                  <a14:hiddenLine xmlns:a14="http://schemas.microsoft.com/office/drawing/2010/main" xmlns="" w="9525">
+                  <a14:hiddenLine xmlns="" xmlns:a14="http://schemas.microsoft.com/office/drawing/2010/main" w="9525">
                     <a:solidFill>
                       <a:srgbClr val="000000"/>
                     </a:solidFill>
@@ -10612,7 +10612,7 @@
               </a:ln>
               <a:extLst>
                 <a:ext uri="{91240B29-F687-4f45-9708-019B960494DF}">
-                  <a14:hiddenLine xmlns:a14="http://schemas.microsoft.com/office/drawing/2010/main" xmlns="" w="9525">
+                  <a14:hiddenLine xmlns="" xmlns:a14="http://schemas.microsoft.com/office/drawing/2010/main" w="9525">
                     <a:solidFill>
                       <a:srgbClr val="000000"/>
                     </a:solidFill>
@@ -10674,7 +10674,7 @@
               </a:ln>
               <a:extLst>
                 <a:ext uri="{91240B29-F687-4f45-9708-019B960494DF}">
-                  <a14:hiddenLine xmlns:a14="http://schemas.microsoft.com/office/drawing/2010/main" xmlns="" w="9525">
+                  <a14:hiddenLine xmlns="" xmlns:a14="http://schemas.microsoft.com/office/drawing/2010/main" w="9525">
                     <a:solidFill>
                       <a:srgbClr val="000000"/>
                     </a:solidFill>
@@ -10784,7 +10784,7 @@
               </a:ln>
               <a:extLst>
                 <a:ext uri="{91240B29-F687-4f45-9708-019B960494DF}">
-                  <a14:hiddenLine xmlns:a14="http://schemas.microsoft.com/office/drawing/2010/main" xmlns="" w="9525">
+                  <a14:hiddenLine xmlns="" xmlns:a14="http://schemas.microsoft.com/office/drawing/2010/main" w="9525">
                     <a:solidFill>
                       <a:srgbClr val="000000"/>
                     </a:solidFill>
@@ -10868,7 +10868,7 @@
               </a:ln>
               <a:extLst>
                 <a:ext uri="{91240B29-F687-4f45-9708-019B960494DF}">
-                  <a14:hiddenLine xmlns:a14="http://schemas.microsoft.com/office/drawing/2010/main" xmlns="" w="9525">
+                  <a14:hiddenLine xmlns="" xmlns:a14="http://schemas.microsoft.com/office/drawing/2010/main" w="9525">
                     <a:solidFill>
                       <a:srgbClr val="000000"/>
                     </a:solidFill>
@@ -10930,7 +10930,7 @@
               </a:ln>
               <a:extLst>
                 <a:ext uri="{91240B29-F687-4f45-9708-019B960494DF}">
-                  <a14:hiddenLine xmlns:a14="http://schemas.microsoft.com/office/drawing/2010/main" xmlns="" w="9525">
+                  <a14:hiddenLine xmlns="" xmlns:a14="http://schemas.microsoft.com/office/drawing/2010/main" w="9525">
                     <a:solidFill>
                       <a:srgbClr val="000000"/>
                     </a:solidFill>
@@ -10992,7 +10992,7 @@
               </a:ln>
               <a:extLst>
                 <a:ext uri="{91240B29-F687-4f45-9708-019B960494DF}">
-                  <a14:hiddenLine xmlns:a14="http://schemas.microsoft.com/office/drawing/2010/main" xmlns="" w="9525">
+                  <a14:hiddenLine xmlns="" xmlns:a14="http://schemas.microsoft.com/office/drawing/2010/main" w="9525">
                     <a:solidFill>
                       <a:srgbClr val="000000"/>
                     </a:solidFill>
@@ -11082,7 +11082,7 @@
               </a:ln>
               <a:extLst>
                 <a:ext uri="{91240B29-F687-4f45-9708-019B960494DF}">
-                  <a14:hiddenLine xmlns:a14="http://schemas.microsoft.com/office/drawing/2010/main" xmlns="" w="9525">
+                  <a14:hiddenLine xmlns="" xmlns:a14="http://schemas.microsoft.com/office/drawing/2010/main" w="9525">
                     <a:solidFill>
                       <a:srgbClr val="000000"/>
                     </a:solidFill>
@@ -11116,7 +11116,7 @@
               </a:ln>
               <a:extLst>
                 <a:ext uri="{91240B29-F687-4f45-9708-019B960494DF}">
-                  <a14:hiddenLine xmlns:a14="http://schemas.microsoft.com/office/drawing/2010/main" xmlns="" w="9525">
+                  <a14:hiddenLine xmlns="" xmlns:a14="http://schemas.microsoft.com/office/drawing/2010/main" w="9525">
                     <a:solidFill>
                       <a:srgbClr val="000000"/>
                     </a:solidFill>
@@ -11181,7 +11181,7 @@
               </a:ln>
               <a:extLst>
                 <a:ext uri="{91240B29-F687-4f45-9708-019B960494DF}">
-                  <a14:hiddenLine xmlns:a14="http://schemas.microsoft.com/office/drawing/2010/main" xmlns="" w="9525">
+                  <a14:hiddenLine xmlns="" xmlns:a14="http://schemas.microsoft.com/office/drawing/2010/main" w="9525">
                     <a:solidFill>
                       <a:srgbClr val="000000"/>
                     </a:solidFill>
@@ -11271,7 +11271,7 @@
               </a:ln>
               <a:extLst>
                 <a:ext uri="{91240B29-F687-4f45-9708-019B960494DF}">
-                  <a14:hiddenLine xmlns:a14="http://schemas.microsoft.com/office/drawing/2010/main" xmlns="" w="9525">
+                  <a14:hiddenLine xmlns="" xmlns:a14="http://schemas.microsoft.com/office/drawing/2010/main" w="9525">
                     <a:solidFill>
                       <a:srgbClr val="000000"/>
                     </a:solidFill>
@@ -11333,7 +11333,7 @@
               </a:ln>
               <a:extLst>
                 <a:ext uri="{91240B29-F687-4f45-9708-019B960494DF}">
-                  <a14:hiddenLine xmlns:a14="http://schemas.microsoft.com/office/drawing/2010/main" xmlns="" w="9525">
+                  <a14:hiddenLine xmlns="" xmlns:a14="http://schemas.microsoft.com/office/drawing/2010/main" w="9525">
                     <a:solidFill>
                       <a:srgbClr val="000000"/>
                     </a:solidFill>
@@ -11423,7 +11423,7 @@
               </a:ln>
               <a:extLst>
                 <a:ext uri="{91240B29-F687-4f45-9708-019B960494DF}">
-                  <a14:hiddenLine xmlns:a14="http://schemas.microsoft.com/office/drawing/2010/main" xmlns="" w="9525">
+                  <a14:hiddenLine xmlns="" xmlns:a14="http://schemas.microsoft.com/office/drawing/2010/main" w="9525">
                     <a:solidFill>
                       <a:srgbClr val="000000"/>
                     </a:solidFill>
@@ -11488,7 +11488,7 @@
               </a:ln>
               <a:extLst>
                 <a:ext uri="{91240B29-F687-4f45-9708-019B960494DF}">
-                  <a14:hiddenLine xmlns:a14="http://schemas.microsoft.com/office/drawing/2010/main" xmlns="" w="9525">
+                  <a14:hiddenLine xmlns="" xmlns:a14="http://schemas.microsoft.com/office/drawing/2010/main" w="9525">
                     <a:solidFill>
                       <a:srgbClr val="000000"/>
                     </a:solidFill>
@@ -11550,7 +11550,7 @@
               </a:ln>
               <a:extLst>
                 <a:ext uri="{91240B29-F687-4f45-9708-019B960494DF}">
-                  <a14:hiddenLine xmlns:a14="http://schemas.microsoft.com/office/drawing/2010/main" xmlns="" w="9525">
+                  <a14:hiddenLine xmlns="" xmlns:a14="http://schemas.microsoft.com/office/drawing/2010/main" w="9525">
                     <a:solidFill>
                       <a:srgbClr val="000000"/>
                     </a:solidFill>
@@ -11640,7 +11640,7 @@
               </a:ln>
               <a:extLst>
                 <a:ext uri="{91240B29-F687-4f45-9708-019B960494DF}">
-                  <a14:hiddenLine xmlns:a14="http://schemas.microsoft.com/office/drawing/2010/main" xmlns="" w="9525">
+                  <a14:hiddenLine xmlns="" xmlns:a14="http://schemas.microsoft.com/office/drawing/2010/main" w="9525">
                     <a:solidFill>
                       <a:srgbClr val="000000"/>
                     </a:solidFill>
@@ -11730,7 +11730,7 @@
               </a:ln>
               <a:extLst>
                 <a:ext uri="{91240B29-F687-4f45-9708-019B960494DF}">
-                  <a14:hiddenLine xmlns:a14="http://schemas.microsoft.com/office/drawing/2010/main" xmlns="" w="9525">
+                  <a14:hiddenLine xmlns="" xmlns:a14="http://schemas.microsoft.com/office/drawing/2010/main" w="9525">
                     <a:solidFill>
                       <a:srgbClr val="000000"/>
                     </a:solidFill>
@@ -11795,7 +11795,7 @@
               </a:ln>
               <a:extLst>
                 <a:ext uri="{91240B29-F687-4f45-9708-019B960494DF}">
-                  <a14:hiddenLine xmlns:a14="http://schemas.microsoft.com/office/drawing/2010/main" xmlns="" w="9525">
+                  <a14:hiddenLine xmlns="" xmlns:a14="http://schemas.microsoft.com/office/drawing/2010/main" w="9525">
                     <a:solidFill>
                       <a:srgbClr val="000000"/>
                     </a:solidFill>
@@ -11915,7 +11915,7 @@
               </a:ln>
               <a:extLst>
                 <a:ext uri="{91240B29-F687-4f45-9708-019B960494DF}">
-                  <a14:hiddenLine xmlns:a14="http://schemas.microsoft.com/office/drawing/2010/main" xmlns="" w="9525">
+                  <a14:hiddenLine xmlns="" xmlns:a14="http://schemas.microsoft.com/office/drawing/2010/main" w="9525">
                     <a:solidFill>
                       <a:srgbClr val="000000"/>
                     </a:solidFill>
@@ -11996,7 +11996,7 @@
               </a:ln>
               <a:extLst>
                 <a:ext uri="{91240B29-F687-4f45-9708-019B960494DF}">
-                  <a14:hiddenLine xmlns:a14="http://schemas.microsoft.com/office/drawing/2010/main" xmlns="" w="9525">
+                  <a14:hiddenLine xmlns="" xmlns:a14="http://schemas.microsoft.com/office/drawing/2010/main" w="9525">
                     <a:solidFill>
                       <a:srgbClr val="000000"/>
                     </a:solidFill>
@@ -12111,7 +12111,7 @@
               </a:ln>
               <a:extLst>
                 <a:ext uri="{91240B29-F687-4f45-9708-019B960494DF}">
-                  <a14:hiddenLine xmlns:a14="http://schemas.microsoft.com/office/drawing/2010/main" xmlns="" w="9525">
+                  <a14:hiddenLine xmlns="" xmlns:a14="http://schemas.microsoft.com/office/drawing/2010/main" w="9525">
                     <a:solidFill>
                       <a:srgbClr val="000000"/>
                     </a:solidFill>
@@ -12201,7 +12201,7 @@
               </a:ln>
               <a:extLst>
                 <a:ext uri="{91240B29-F687-4f45-9708-019B960494DF}">
-                  <a14:hiddenLine xmlns:a14="http://schemas.microsoft.com/office/drawing/2010/main" xmlns="" w="9525">
+                  <a14:hiddenLine xmlns="" xmlns:a14="http://schemas.microsoft.com/office/drawing/2010/main" w="9525">
                     <a:solidFill>
                       <a:srgbClr val="000000"/>
                     </a:solidFill>
@@ -12266,7 +12266,7 @@
               </a:ln>
               <a:extLst>
                 <a:ext uri="{91240B29-F687-4f45-9708-019B960494DF}">
-                  <a14:hiddenLine xmlns:a14="http://schemas.microsoft.com/office/drawing/2010/main" xmlns="" w="9525">
+                  <a14:hiddenLine xmlns="" xmlns:a14="http://schemas.microsoft.com/office/drawing/2010/main" w="9525">
                     <a:solidFill>
                       <a:srgbClr val="000000"/>
                     </a:solidFill>
@@ -12356,7 +12356,7 @@
               </a:ln>
               <a:extLst>
                 <a:ext uri="{91240B29-F687-4f45-9708-019B960494DF}">
-                  <a14:hiddenLine xmlns:a14="http://schemas.microsoft.com/office/drawing/2010/main" xmlns="" w="9525">
+                  <a14:hiddenLine xmlns="" xmlns:a14="http://schemas.microsoft.com/office/drawing/2010/main" w="9525">
                     <a:solidFill>
                       <a:srgbClr val="000000"/>
                     </a:solidFill>
@@ -12424,7 +12424,7 @@
               </a:ln>
               <a:extLst>
                 <a:ext uri="{91240B29-F687-4f45-9708-019B960494DF}">
-                  <a14:hiddenLine xmlns:a14="http://schemas.microsoft.com/office/drawing/2010/main" xmlns="" w="9525">
+                  <a14:hiddenLine xmlns="" xmlns:a14="http://schemas.microsoft.com/office/drawing/2010/main" w="9525">
                     <a:solidFill>
                       <a:srgbClr val="000000"/>
                     </a:solidFill>
@@ -12514,7 +12514,7 @@
               </a:ln>
               <a:extLst>
                 <a:ext uri="{91240B29-F687-4f45-9708-019B960494DF}">
-                  <a14:hiddenLine xmlns:a14="http://schemas.microsoft.com/office/drawing/2010/main" xmlns="" w="9525">
+                  <a14:hiddenLine xmlns="" xmlns:a14="http://schemas.microsoft.com/office/drawing/2010/main" w="9525">
                     <a:solidFill>
                       <a:srgbClr val="000000"/>
                     </a:solidFill>
@@ -12582,7 +12582,7 @@
               </a:ln>
               <a:extLst>
                 <a:ext uri="{91240B29-F687-4f45-9708-019B960494DF}">
-                  <a14:hiddenLine xmlns:a14="http://schemas.microsoft.com/office/drawing/2010/main" xmlns="" w="9525">
+                  <a14:hiddenLine xmlns="" xmlns:a14="http://schemas.microsoft.com/office/drawing/2010/main" w="9525">
                     <a:solidFill>
                       <a:srgbClr val="000000"/>
                     </a:solidFill>
@@ -12672,7 +12672,7 @@
               </a:ln>
               <a:extLst>
                 <a:ext uri="{91240B29-F687-4f45-9708-019B960494DF}">
-                  <a14:hiddenLine xmlns:a14="http://schemas.microsoft.com/office/drawing/2010/main" xmlns="" w="9525">
+                  <a14:hiddenLine xmlns="" xmlns:a14="http://schemas.microsoft.com/office/drawing/2010/main" w="9525">
                     <a:solidFill>
                       <a:srgbClr val="000000"/>
                     </a:solidFill>
@@ -12706,7 +12706,7 @@
               </a:ln>
               <a:extLst>
                 <a:ext uri="{91240B29-F687-4f45-9708-019B960494DF}">
-                  <a14:hiddenLine xmlns:a14="http://schemas.microsoft.com/office/drawing/2010/main" xmlns="" w="9525">
+                  <a14:hiddenLine xmlns="" xmlns:a14="http://schemas.microsoft.com/office/drawing/2010/main" w="9525">
                     <a:solidFill>
                       <a:srgbClr val="000000"/>
                     </a:solidFill>
@@ -12847,7 +12847,7 @@
             <a:fld id="{48A87A34-81AB-432B-8DAE-1953F412C126}" type="datetimeFigureOut">
               <a:rPr lang="en-US" dirty="0"/>
               <a:pPr/>
-              <a:t>4/26/2019</a:t>
+              <a:t>4/30/2019</a:t>
             </a:fld>
             <a:endParaRPr lang="en-US" dirty="0"/>
           </a:p>
@@ -14638,6 +14638,180 @@
   <p:clrMapOvr>
     <a:masterClrMapping/>
   </p:clrMapOvr>
+  <p:timing>
+    <p:tnLst>
+      <p:par>
+        <p:cTn id="1" dur="indefinite" restart="never" nodeType="tmRoot">
+          <p:childTnLst>
+            <p:seq concurrent="1" nextAc="seek">
+              <p:cTn id="2" dur="indefinite" nodeType="mainSeq">
+                <p:childTnLst>
+                  <p:par>
+                    <p:cTn id="3" fill="hold">
+                      <p:stCondLst>
+                        <p:cond delay="indefinite"/>
+                      </p:stCondLst>
+                      <p:childTnLst>
+                        <p:par>
+                          <p:cTn id="4" fill="hold">
+                            <p:stCondLst>
+                              <p:cond delay="0"/>
+                            </p:stCondLst>
+                            <p:childTnLst>
+                              <p:par>
+                                <p:cTn id="5" presetID="1" presetClass="entr" presetSubtype="0" fill="hold" grpId="0" nodeType="clickEffect">
+                                  <p:stCondLst>
+                                    <p:cond delay="0"/>
+                                  </p:stCondLst>
+                                  <p:childTnLst>
+                                    <p:set>
+                                      <p:cBhvr>
+                                        <p:cTn id="6" dur="1" fill="hold">
+                                          <p:stCondLst>
+                                            <p:cond delay="0"/>
+                                          </p:stCondLst>
+                                        </p:cTn>
+                                        <p:tgtEl>
+                                          <p:spTgt spid="3">
+                                            <p:txEl>
+                                              <p:pRg st="0" end="0"/>
+                                            </p:txEl>
+                                          </p:spTgt>
+                                        </p:tgtEl>
+                                        <p:attrNameLst>
+                                          <p:attrName>style.visibility</p:attrName>
+                                        </p:attrNameLst>
+                                      </p:cBhvr>
+                                      <p:to>
+                                        <p:strVal val="visible"/>
+                                      </p:to>
+                                    </p:set>
+                                  </p:childTnLst>
+                                </p:cTn>
+                              </p:par>
+                            </p:childTnLst>
+                          </p:cTn>
+                        </p:par>
+                      </p:childTnLst>
+                    </p:cTn>
+                  </p:par>
+                  <p:par>
+                    <p:cTn id="7" fill="hold">
+                      <p:stCondLst>
+                        <p:cond delay="indefinite"/>
+                      </p:stCondLst>
+                      <p:childTnLst>
+                        <p:par>
+                          <p:cTn id="8" fill="hold">
+                            <p:stCondLst>
+                              <p:cond delay="0"/>
+                            </p:stCondLst>
+                            <p:childTnLst>
+                              <p:par>
+                                <p:cTn id="9" presetID="1" presetClass="entr" presetSubtype="0" fill="hold" grpId="0" nodeType="clickEffect">
+                                  <p:stCondLst>
+                                    <p:cond delay="0"/>
+                                  </p:stCondLst>
+                                  <p:childTnLst>
+                                    <p:set>
+                                      <p:cBhvr>
+                                        <p:cTn id="10" dur="1" fill="hold">
+                                          <p:stCondLst>
+                                            <p:cond delay="0"/>
+                                          </p:stCondLst>
+                                        </p:cTn>
+                                        <p:tgtEl>
+                                          <p:spTgt spid="4"/>
+                                        </p:tgtEl>
+                                        <p:attrNameLst>
+                                          <p:attrName>style.visibility</p:attrName>
+                                        </p:attrNameLst>
+                                      </p:cBhvr>
+                                      <p:to>
+                                        <p:strVal val="visible"/>
+                                      </p:to>
+                                    </p:set>
+                                  </p:childTnLst>
+                                </p:cTn>
+                              </p:par>
+                            </p:childTnLst>
+                          </p:cTn>
+                        </p:par>
+                      </p:childTnLst>
+                    </p:cTn>
+                  </p:par>
+                  <p:par>
+                    <p:cTn id="11" fill="hold">
+                      <p:stCondLst>
+                        <p:cond delay="indefinite"/>
+                      </p:stCondLst>
+                      <p:childTnLst>
+                        <p:par>
+                          <p:cTn id="12" fill="hold">
+                            <p:stCondLst>
+                              <p:cond delay="0"/>
+                            </p:stCondLst>
+                            <p:childTnLst>
+                              <p:par>
+                                <p:cTn id="13" presetID="1" presetClass="entr" presetSubtype="0" fill="hold" grpId="0" nodeType="clickEffect">
+                                  <p:stCondLst>
+                                    <p:cond delay="0"/>
+                                  </p:stCondLst>
+                                  <p:childTnLst>
+                                    <p:set>
+                                      <p:cBhvr>
+                                        <p:cTn id="14" dur="1" fill="hold">
+                                          <p:stCondLst>
+                                            <p:cond delay="0"/>
+                                          </p:stCondLst>
+                                        </p:cTn>
+                                        <p:tgtEl>
+                                          <p:spTgt spid="5"/>
+                                        </p:tgtEl>
+                                        <p:attrNameLst>
+                                          <p:attrName>style.visibility</p:attrName>
+                                        </p:attrNameLst>
+                                      </p:cBhvr>
+                                      <p:to>
+                                        <p:strVal val="visible"/>
+                                      </p:to>
+                                    </p:set>
+                                  </p:childTnLst>
+                                </p:cTn>
+                              </p:par>
+                            </p:childTnLst>
+                          </p:cTn>
+                        </p:par>
+                      </p:childTnLst>
+                    </p:cTn>
+                  </p:par>
+                </p:childTnLst>
+              </p:cTn>
+              <p:prevCondLst>
+                <p:cond evt="onPrev" delay="0">
+                  <p:tgtEl>
+                    <p:sldTgt/>
+                  </p:tgtEl>
+                </p:cond>
+              </p:prevCondLst>
+              <p:nextCondLst>
+                <p:cond evt="onNext" delay="0">
+                  <p:tgtEl>
+                    <p:sldTgt/>
+                  </p:tgtEl>
+                </p:cond>
+              </p:nextCondLst>
+            </p:seq>
+          </p:childTnLst>
+        </p:cTn>
+      </p:par>
+    </p:tnLst>
+    <p:bldLst>
+      <p:bldP spid="3" grpId="0" build="p"/>
+      <p:bldP spid="4" grpId="0"/>
+      <p:bldP spid="5" grpId="0"/>
+    </p:bldLst>
+  </p:timing>
 </p:sld>
 </file>
 

</xml_diff>